<commit_message>
Motor bebiendo de CSV_AnteproyectoFINALIZADO
</commit_message>
<xml_diff>
--- a/docs/enunciado-de-patrones.pptx
+++ b/docs/enunciado-de-patrones.pptx
@@ -1,33 +1,32 @@
 
 <file path=ppt/presentation.xml><?xml version="1.0" encoding="utf-8"?>
-<!--Generated by Spire.Presentation for .NET 2.4.27.11040-->
 <p:presentation xmlns:a="http://schemas.openxmlformats.org/drawingml/2006/main" xmlns:r="http://schemas.openxmlformats.org/officeDocument/2006/relationships" xmlns:p="http://schemas.openxmlformats.org/presentationml/2006/main" saveSubsetFonts="1">
   <p:sldMasterIdLst>
-    <p:sldMasterId r:id="rId1" id="2147483660"/>
+    <p:sldMasterId id="2147483660" r:id="rId1"/>
   </p:sldMasterIdLst>
   <p:sldIdLst>
-    <p:sldId r:id="rId2" id="256"/>
-    <p:sldId r:id="rId7" id="257"/>
-    <p:sldId r:id="rId8" id="258"/>
-    <p:sldId r:id="rId9" id="259"/>
-    <p:sldId r:id="rId10" id="260"/>
-    <p:sldId r:id="rId11" id="261"/>
-    <p:sldId r:id="rId12" id="262"/>
-    <p:sldId r:id="rId13" id="263"/>
-    <p:sldId r:id="rId14" id="264"/>
-    <p:sldId r:id="rId15" id="265"/>
-    <p:sldId r:id="rId16" id="266"/>
-    <p:sldId r:id="rId17" id="267"/>
-    <p:sldId r:id="rId18" id="268"/>
-    <p:sldId r:id="rId19" id="269"/>
-    <p:sldId r:id="rId20" id="270"/>
-    <p:sldId r:id="rId21" id="271"/>
-    <p:sldId r:id="rId22" id="272"/>
+    <p:sldId id="256" r:id="rId2"/>
+    <p:sldId id="257" r:id="rId3"/>
+    <p:sldId id="258" r:id="rId4"/>
+    <p:sldId id="259" r:id="rId5"/>
+    <p:sldId id="260" r:id="rId6"/>
+    <p:sldId id="261" r:id="rId7"/>
+    <p:sldId id="262" r:id="rId8"/>
+    <p:sldId id="263" r:id="rId9"/>
+    <p:sldId id="264" r:id="rId10"/>
+    <p:sldId id="265" r:id="rId11"/>
+    <p:sldId id="266" r:id="rId12"/>
+    <p:sldId id="267" r:id="rId13"/>
+    <p:sldId id="268" r:id="rId14"/>
+    <p:sldId id="269" r:id="rId15"/>
+    <p:sldId id="270" r:id="rId16"/>
+    <p:sldId id="271" r:id="rId17"/>
+    <p:sldId id="272" r:id="rId18"/>
   </p:sldIdLst>
   <p:sldSz cx="12192000" cy="6858000"/>
   <p:notesSz cx="6858000" cy="9144000"/>
   <p:custDataLst>
-    <p:tags r:id="rId23"/>
+    <p:tags r:id="rId19"/>
   </p:custDataLst>
   <p:defaultTextStyle>
     <a:defPPr>
@@ -169,7 +168,9 @@
             <a:off x="11278" y="0"/>
             <a:ext cx="12180722" cy="6858000"/>
           </a:xfrm>
-          <a:prstGeom prst="rect"/>
+          <a:prstGeom prst="rect">
+            <a:avLst/>
+          </a:prstGeom>
           <a:noFill/>
           <a:ln>
             <a:noFill/>
@@ -224,10 +225,9 @@
               <a:buNone/>
             </a:pPr>
             <a:r>
-              <a:rPr lang="en-US" dirty="1" smtClean="0"/>
+              <a:rPr lang="en-US"/>
               <a:t>Click to edit Master title style</a:t>
             </a:r>
-            <a:endParaRPr lang="en-US"/>
           </a:p>
         </p:txBody>
       </p:sp>
@@ -289,10 +289,9 @@
           </a:lstStyle>
           <a:p>
             <a:r>
-              <a:rPr lang="en-US" dirty="1" smtClean="0"/>
+              <a:rPr lang="en-US"/>
               <a:t>Click to edit Master subtitle style</a:t>
             </a:r>
-            <a:endParaRPr lang="en-US"/>
           </a:p>
         </p:txBody>
       </p:sp>
@@ -313,7 +312,7 @@
           <a:p>
             <a:fld id="{DFC38CE7-3C27-4225-9194-9B27B74ACB3B}" type="datetimeFigureOut">
               <a:rPr lang="en-US" smtClean="0"/>
-              <a:t>1/14/2016</a:t>
+              <a:t>1/30/2018</a:t>
             </a:fld>
             <a:endParaRPr lang="en-US"/>
           </a:p>
@@ -355,7 +354,7 @@
           <a:p>
             <a:fld id="{E87EF853-8C0C-4258-AABE-042B01E2ACC4}" type="slidenum">
               <a:rPr lang="en-US" smtClean="0"/>
-              <a:t>‹#›</a:t>
+              <a:t>‹Nº›</a:t>
             </a:fld>
             <a:endParaRPr lang="en-US"/>
           </a:p>
@@ -371,13 +370,6 @@
   <p:clrMapOvr>
     <a:masterClrMapping/>
   </p:clrMapOvr>
-  <p:timing>
-    <p:tnLst>
-      <p:par>
-        <p:cTn id="1" dur="indefinite" restart="never" nodeType="tmRoot"/>
-      </p:par>
-    </p:tnLst>
-  </p:timing>
 </p:sldLayout>
 </file>
 
@@ -414,10 +406,9 @@
           <a:lstStyle/>
           <a:p>
             <a:r>
-              <a:rPr lang="en-US" dirty="1" smtClean="0"/>
+              <a:rPr lang="en-US"/>
               <a:t>Click to edit Master title style</a:t>
             </a:r>
-            <a:endParaRPr lang="en-US"/>
           </a:p>
         </p:txBody>
       </p:sp>
@@ -438,38 +429,37 @@
           <a:p>
             <a:pPr lvl="0"/>
             <a:r>
-              <a:rPr lang="en-US" dirty="1" smtClean="0"/>
+              <a:rPr lang="en-US"/>
               <a:t>Click to edit Master text styles</a:t>
             </a:r>
           </a:p>
           <a:p>
             <a:pPr lvl="1"/>
             <a:r>
-              <a:rPr lang="en-US" dirty="1" smtClean="0"/>
+              <a:rPr lang="en-US"/>
               <a:t>Second level</a:t>
             </a:r>
           </a:p>
           <a:p>
             <a:pPr lvl="2"/>
             <a:r>
-              <a:rPr lang="en-US" dirty="1" smtClean="0"/>
+              <a:rPr lang="en-US"/>
               <a:t>Third level</a:t>
             </a:r>
           </a:p>
           <a:p>
             <a:pPr lvl="3"/>
             <a:r>
-              <a:rPr lang="en-US" dirty="1" smtClean="0"/>
+              <a:rPr lang="en-US"/>
               <a:t>Fourth level</a:t>
             </a:r>
           </a:p>
           <a:p>
             <a:pPr lvl="4"/>
             <a:r>
-              <a:rPr lang="en-US" dirty="1" smtClean="0"/>
+              <a:rPr lang="en-US"/>
               <a:t>Fifth level</a:t>
             </a:r>
-            <a:endParaRPr lang="en-US"/>
           </a:p>
         </p:txBody>
       </p:sp>
@@ -490,7 +480,7 @@
           <a:p>
             <a:fld id="{DFC38CE7-3C27-4225-9194-9B27B74ACB3B}" type="datetimeFigureOut">
               <a:rPr lang="en-US" smtClean="0"/>
-              <a:t>1/14/2016</a:t>
+              <a:t>1/30/2018</a:t>
             </a:fld>
             <a:endParaRPr lang="en-US"/>
           </a:p>
@@ -532,7 +522,7 @@
           <a:p>
             <a:fld id="{E87EF853-8C0C-4258-AABE-042B01E2ACC4}" type="slidenum">
               <a:rPr lang="en-US" smtClean="0"/>
-              <a:t>‹#›</a:t>
+              <a:t>‹Nº›</a:t>
             </a:fld>
             <a:endParaRPr lang="en-US"/>
           </a:p>
@@ -548,13 +538,6 @@
   <p:clrMapOvr>
     <a:masterClrMapping/>
   </p:clrMapOvr>
-  <p:timing>
-    <p:tnLst>
-      <p:par>
-        <p:cTn id="1" dur="indefinite" restart="never" nodeType="tmRoot"/>
-      </p:par>
-    </p:tnLst>
-  </p:timing>
 </p:sldLayout>
 </file>
 
@@ -596,10 +579,9 @@
           <a:lstStyle/>
           <a:p>
             <a:r>
-              <a:rPr lang="en-US" dirty="1" smtClean="0"/>
+              <a:rPr lang="en-US"/>
               <a:t>Click to edit Master title style</a:t>
             </a:r>
-            <a:endParaRPr lang="en-US"/>
           </a:p>
         </p:txBody>
       </p:sp>
@@ -625,38 +607,37 @@
           <a:p>
             <a:pPr lvl="0"/>
             <a:r>
-              <a:rPr lang="en-US" dirty="1" smtClean="0"/>
+              <a:rPr lang="en-US"/>
               <a:t>Click to edit Master text styles</a:t>
             </a:r>
           </a:p>
           <a:p>
             <a:pPr lvl="1"/>
             <a:r>
-              <a:rPr lang="en-US" dirty="1" smtClean="0"/>
+              <a:rPr lang="en-US"/>
               <a:t>Second level</a:t>
             </a:r>
           </a:p>
           <a:p>
             <a:pPr lvl="2"/>
             <a:r>
-              <a:rPr lang="en-US" dirty="1" smtClean="0"/>
+              <a:rPr lang="en-US"/>
               <a:t>Third level</a:t>
             </a:r>
           </a:p>
           <a:p>
             <a:pPr lvl="3"/>
             <a:r>
-              <a:rPr lang="en-US" dirty="1" smtClean="0"/>
+              <a:rPr lang="en-US"/>
               <a:t>Fourth level</a:t>
             </a:r>
           </a:p>
           <a:p>
             <a:pPr lvl="4"/>
             <a:r>
-              <a:rPr lang="en-US" dirty="1" smtClean="0"/>
+              <a:rPr lang="en-US"/>
               <a:t>Fifth level</a:t>
             </a:r>
-            <a:endParaRPr lang="en-US"/>
           </a:p>
         </p:txBody>
       </p:sp>
@@ -677,7 +658,7 @@
           <a:p>
             <a:fld id="{DFC38CE7-3C27-4225-9194-9B27B74ACB3B}" type="datetimeFigureOut">
               <a:rPr lang="en-US" smtClean="0"/>
-              <a:t>1/14/2016</a:t>
+              <a:t>1/30/2018</a:t>
             </a:fld>
             <a:endParaRPr lang="en-US"/>
           </a:p>
@@ -719,7 +700,7 @@
           <a:p>
             <a:fld id="{E87EF853-8C0C-4258-AABE-042B01E2ACC4}" type="slidenum">
               <a:rPr lang="en-US" smtClean="0"/>
-              <a:t>‹#›</a:t>
+              <a:t>‹Nº›</a:t>
             </a:fld>
             <a:endParaRPr lang="en-US"/>
           </a:p>
@@ -735,13 +716,6 @@
   <p:clrMapOvr>
     <a:masterClrMapping/>
   </p:clrMapOvr>
-  <p:timing>
-    <p:tnLst>
-      <p:par>
-        <p:cTn id="1" dur="indefinite" restart="never" nodeType="tmRoot"/>
-      </p:par>
-    </p:tnLst>
-  </p:timing>
 </p:sldLayout>
 </file>
 
@@ -778,10 +752,9 @@
           <a:lstStyle/>
           <a:p>
             <a:r>
-              <a:rPr lang="en-US" dirty="1" smtClean="0"/>
+              <a:rPr lang="en-US"/>
               <a:t>Click to edit Master title style</a:t>
             </a:r>
-            <a:endParaRPr lang="en-US"/>
           </a:p>
         </p:txBody>
       </p:sp>
@@ -802,7 +775,7 @@
           <a:p>
             <a:fld id="{DFC38CE7-3C27-4225-9194-9B27B74ACB3B}" type="datetimeFigureOut">
               <a:rPr lang="en-US" smtClean="0"/>
-              <a:t>1/14/2016</a:t>
+              <a:t>1/30/2018</a:t>
             </a:fld>
             <a:endParaRPr lang="en-US"/>
           </a:p>
@@ -844,7 +817,7 @@
           <a:p>
             <a:fld id="{E87EF853-8C0C-4258-AABE-042B01E2ACC4}" type="slidenum">
               <a:rPr lang="en-US" smtClean="0"/>
-              <a:t>‹#›</a:t>
+              <a:t>‹Nº›</a:t>
             </a:fld>
             <a:endParaRPr lang="en-US"/>
           </a:p>
@@ -860,13 +833,6 @@
   <p:clrMapOvr>
     <a:masterClrMapping/>
   </p:clrMapOvr>
-  <p:timing>
-    <p:tnLst>
-      <p:par>
-        <p:cTn id="1" dur="indefinite" restart="never" nodeType="tmRoot"/>
-      </p:par>
-    </p:tnLst>
-  </p:timing>
 </p:sldLayout>
 </file>
 
@@ -912,7 +878,9 @@
               <a:off x="403860" y="2110740"/>
               <a:ext cx="914400" cy="914400"/>
             </a:xfrm>
-            <a:prstGeom prst="rect"/>
+            <a:prstGeom prst="rect">
+              <a:avLst/>
+            </a:prstGeom>
             <a:solidFill>
               <a:srgbClr val="1D599E"/>
             </a:solidFill>
@@ -956,7 +924,9 @@
               <a:off x="403860" y="2040695"/>
               <a:ext cx="914400" cy="99060"/>
             </a:xfrm>
-            <a:prstGeom prst="rect"/>
+            <a:prstGeom prst="rect">
+              <a:avLst/>
+            </a:prstGeom>
             <a:solidFill>
               <a:srgbClr val="F5A10F"/>
             </a:solidFill>
@@ -1000,7 +970,9 @@
               <a:off x="403860" y="3025140"/>
               <a:ext cx="914400" cy="99060"/>
             </a:xfrm>
-            <a:prstGeom prst="rect"/>
+            <a:prstGeom prst="rect">
+              <a:avLst/>
+            </a:prstGeom>
             <a:solidFill>
               <a:srgbClr val="F5A10F"/>
             </a:solidFill>
@@ -1055,10 +1027,9 @@
           <a:lstStyle/>
           <a:p>
             <a:r>
-              <a:rPr lang="en-US" dirty="1" smtClean="0"/>
+              <a:rPr lang="en-US"/>
               <a:t>Click to edit Master title style</a:t>
             </a:r>
-            <a:endParaRPr lang="en-US"/>
           </a:p>
         </p:txBody>
       </p:sp>
@@ -1079,7 +1050,7 @@
           <a:p>
             <a:fld id="{DFC38CE7-3C27-4225-9194-9B27B74ACB3B}" type="datetimeFigureOut">
               <a:rPr lang="en-US" smtClean="0"/>
-              <a:t>1/14/2016</a:t>
+              <a:t>1/30/2018</a:t>
             </a:fld>
             <a:endParaRPr lang="en-US"/>
           </a:p>
@@ -1121,7 +1092,7 @@
           <a:p>
             <a:fld id="{E87EF853-8C0C-4258-AABE-042B01E2ACC4}" type="slidenum">
               <a:rPr lang="en-US" smtClean="0"/>
-              <a:t>‹#›</a:t>
+              <a:t>‹Nº›</a:t>
             </a:fld>
             <a:endParaRPr lang="en-US"/>
           </a:p>
@@ -1137,13 +1108,6 @@
   <p:clrMapOvr>
     <a:masterClrMapping/>
   </p:clrMapOvr>
-  <p:timing>
-    <p:tnLst>
-      <p:par>
-        <p:cTn id="1" dur="indefinite" restart="never" nodeType="tmRoot"/>
-      </p:par>
-    </p:tnLst>
-  </p:timing>
 </p:sldLayout>
 </file>
 
@@ -1180,10 +1144,9 @@
           <a:lstStyle/>
           <a:p>
             <a:r>
-              <a:rPr lang="en-US" dirty="1" smtClean="0"/>
+              <a:rPr lang="en-US"/>
               <a:t>Click to edit Master title style</a:t>
             </a:r>
-            <a:endParaRPr lang="en-US"/>
           </a:p>
         </p:txBody>
       </p:sp>
@@ -1194,7 +1157,7 @@
             <a:spLocks noGrp="1"/>
           </p:cNvSpPr>
           <p:nvPr>
-            <p:ph type="obj" idx="1"/>
+            <p:ph idx="1"/>
           </p:nvPr>
         </p:nvSpPr>
         <p:spPr/>
@@ -1204,38 +1167,37 @@
           <a:p>
             <a:pPr lvl="0"/>
             <a:r>
-              <a:rPr lang="en-US" dirty="1" smtClean="0"/>
+              <a:rPr lang="en-US"/>
               <a:t>Click to edit Master text styles</a:t>
             </a:r>
           </a:p>
           <a:p>
             <a:pPr lvl="1"/>
             <a:r>
-              <a:rPr lang="en-US" dirty="1" smtClean="0"/>
+              <a:rPr lang="en-US"/>
               <a:t>Second level</a:t>
             </a:r>
           </a:p>
           <a:p>
             <a:pPr lvl="2"/>
             <a:r>
-              <a:rPr lang="en-US" dirty="1" smtClean="0"/>
+              <a:rPr lang="en-US"/>
               <a:t>Third level</a:t>
             </a:r>
           </a:p>
           <a:p>
             <a:pPr lvl="3"/>
             <a:r>
-              <a:rPr lang="en-US" dirty="1" smtClean="0"/>
+              <a:rPr lang="en-US"/>
               <a:t>Fourth level</a:t>
             </a:r>
           </a:p>
           <a:p>
             <a:pPr lvl="4"/>
             <a:r>
-              <a:rPr lang="en-US" dirty="1" smtClean="0"/>
+              <a:rPr lang="en-US"/>
               <a:t>Fifth level</a:t>
             </a:r>
-            <a:endParaRPr lang="en-US"/>
           </a:p>
         </p:txBody>
       </p:sp>
@@ -1256,7 +1218,7 @@
           <a:p>
             <a:fld id="{DFC38CE7-3C27-4225-9194-9B27B74ACB3B}" type="datetimeFigureOut">
               <a:rPr lang="en-US" smtClean="0"/>
-              <a:t>1/14/2016</a:t>
+              <a:t>1/30/2018</a:t>
             </a:fld>
             <a:endParaRPr lang="en-US"/>
           </a:p>
@@ -1298,7 +1260,7 @@
           <a:p>
             <a:fld id="{E87EF853-8C0C-4258-AABE-042B01E2ACC4}" type="slidenum">
               <a:rPr lang="en-US" smtClean="0"/>
-              <a:t>‹#›</a:t>
+              <a:t>‹Nº›</a:t>
             </a:fld>
             <a:endParaRPr lang="en-US"/>
           </a:p>
@@ -1314,13 +1276,6 @@
   <p:clrMapOvr>
     <a:masterClrMapping/>
   </p:clrMapOvr>
-  <p:timing>
-    <p:tnLst>
-      <p:par>
-        <p:cTn id="1" dur="indefinite" restart="never" nodeType="tmRoot"/>
-      </p:par>
-    </p:tnLst>
-  </p:timing>
 </p:sldLayout>
 </file>
 
@@ -1366,10 +1321,9 @@
           </a:lstStyle>
           <a:p>
             <a:r>
-              <a:rPr lang="en-US" dirty="1" smtClean="0"/>
+              <a:rPr lang="en-US"/>
               <a:t>Click to edit Master title style</a:t>
             </a:r>
-            <a:endParaRPr lang="en-US"/>
           </a:p>
         </p:txBody>
       </p:sp>
@@ -1486,7 +1440,7 @@
           <a:p>
             <a:pPr lvl="0"/>
             <a:r>
-              <a:rPr lang="en-US" dirty="1" smtClean="0"/>
+              <a:rPr lang="en-US"/>
               <a:t>Click to edit Master text styles</a:t>
             </a:r>
           </a:p>
@@ -1509,7 +1463,7 @@
           <a:p>
             <a:fld id="{DFC38CE7-3C27-4225-9194-9B27B74ACB3B}" type="datetimeFigureOut">
               <a:rPr lang="en-US" smtClean="0"/>
-              <a:t>1/14/2016</a:t>
+              <a:t>1/30/2018</a:t>
             </a:fld>
             <a:endParaRPr lang="en-US"/>
           </a:p>
@@ -1551,7 +1505,7 @@
           <a:p>
             <a:fld id="{E87EF853-8C0C-4258-AABE-042B01E2ACC4}" type="slidenum">
               <a:rPr lang="en-US" smtClean="0"/>
-              <a:t>‹#›</a:t>
+              <a:t>‹Nº›</a:t>
             </a:fld>
             <a:endParaRPr lang="en-US"/>
           </a:p>
@@ -1567,13 +1521,6 @@
   <p:clrMapOvr>
     <a:masterClrMapping/>
   </p:clrMapOvr>
-  <p:timing>
-    <p:tnLst>
-      <p:par>
-        <p:cTn id="1" dur="indefinite" restart="never" nodeType="tmRoot"/>
-      </p:par>
-    </p:tnLst>
-  </p:timing>
 </p:sldLayout>
 </file>
 
@@ -1610,10 +1557,9 @@
           <a:lstStyle/>
           <a:p>
             <a:r>
-              <a:rPr lang="en-US" dirty="1" smtClean="0"/>
+              <a:rPr lang="en-US"/>
               <a:t>Click to edit Master title style</a:t>
             </a:r>
-            <a:endParaRPr lang="en-US"/>
           </a:p>
         </p:txBody>
       </p:sp>
@@ -1624,7 +1570,7 @@
             <a:spLocks noGrp="1"/>
           </p:cNvSpPr>
           <p:nvPr>
-            <p:ph type="obj" sz="half" idx="1"/>
+            <p:ph sz="half" idx="1"/>
           </p:nvPr>
         </p:nvSpPr>
         <p:spPr>
@@ -1639,38 +1585,37 @@
           <a:p>
             <a:pPr lvl="0"/>
             <a:r>
-              <a:rPr lang="en-US" dirty="1" smtClean="0"/>
+              <a:rPr lang="en-US"/>
               <a:t>Click to edit Master text styles</a:t>
             </a:r>
           </a:p>
           <a:p>
             <a:pPr lvl="1"/>
             <a:r>
-              <a:rPr lang="en-US" dirty="1" smtClean="0"/>
+              <a:rPr lang="en-US"/>
               <a:t>Second level</a:t>
             </a:r>
           </a:p>
           <a:p>
             <a:pPr lvl="2"/>
             <a:r>
-              <a:rPr lang="en-US" dirty="1" smtClean="0"/>
+              <a:rPr lang="en-US"/>
               <a:t>Third level</a:t>
             </a:r>
           </a:p>
           <a:p>
             <a:pPr lvl="3"/>
             <a:r>
-              <a:rPr lang="en-US" dirty="1" smtClean="0"/>
+              <a:rPr lang="en-US"/>
               <a:t>Fourth level</a:t>
             </a:r>
           </a:p>
           <a:p>
             <a:pPr lvl="4"/>
             <a:r>
-              <a:rPr lang="en-US" dirty="1" smtClean="0"/>
+              <a:rPr lang="en-US"/>
               <a:t>Fifth level</a:t>
             </a:r>
-            <a:endParaRPr lang="en-US"/>
           </a:p>
         </p:txBody>
       </p:sp>
@@ -1681,7 +1626,7 @@
             <a:spLocks noGrp="1"/>
           </p:cNvSpPr>
           <p:nvPr>
-            <p:ph type="obj" sz="half" idx="2"/>
+            <p:ph sz="half" idx="2"/>
           </p:nvPr>
         </p:nvSpPr>
         <p:spPr>
@@ -1696,38 +1641,37 @@
           <a:p>
             <a:pPr lvl="0"/>
             <a:r>
-              <a:rPr lang="en-US" dirty="1" smtClean="0"/>
+              <a:rPr lang="en-US"/>
               <a:t>Click to edit Master text styles</a:t>
             </a:r>
           </a:p>
           <a:p>
             <a:pPr lvl="1"/>
             <a:r>
-              <a:rPr lang="en-US" dirty="1" smtClean="0"/>
+              <a:rPr lang="en-US"/>
               <a:t>Second level</a:t>
             </a:r>
           </a:p>
           <a:p>
             <a:pPr lvl="2"/>
             <a:r>
-              <a:rPr lang="en-US" dirty="1" smtClean="0"/>
+              <a:rPr lang="en-US"/>
               <a:t>Third level</a:t>
             </a:r>
           </a:p>
           <a:p>
             <a:pPr lvl="3"/>
             <a:r>
-              <a:rPr lang="en-US" dirty="1" smtClean="0"/>
+              <a:rPr lang="en-US"/>
               <a:t>Fourth level</a:t>
             </a:r>
           </a:p>
           <a:p>
             <a:pPr lvl="4"/>
             <a:r>
-              <a:rPr lang="en-US" dirty="1" smtClean="0"/>
+              <a:rPr lang="en-US"/>
               <a:t>Fifth level</a:t>
             </a:r>
-            <a:endParaRPr lang="en-US"/>
           </a:p>
         </p:txBody>
       </p:sp>
@@ -1748,7 +1692,7 @@
           <a:p>
             <a:fld id="{DFC38CE7-3C27-4225-9194-9B27B74ACB3B}" type="datetimeFigureOut">
               <a:rPr lang="en-US" smtClean="0"/>
-              <a:t>1/14/2016</a:t>
+              <a:t>1/30/2018</a:t>
             </a:fld>
             <a:endParaRPr lang="en-US"/>
           </a:p>
@@ -1790,7 +1734,7 @@
           <a:p>
             <a:fld id="{E87EF853-8C0C-4258-AABE-042B01E2ACC4}" type="slidenum">
               <a:rPr lang="en-US" smtClean="0"/>
-              <a:t>‹#›</a:t>
+              <a:t>‹Nº›</a:t>
             </a:fld>
             <a:endParaRPr lang="en-US"/>
           </a:p>
@@ -1806,13 +1750,6 @@
   <p:clrMapOvr>
     <a:masterClrMapping/>
   </p:clrMapOvr>
-  <p:timing>
-    <p:tnLst>
-      <p:par>
-        <p:cTn id="1" dur="indefinite" restart="never" nodeType="tmRoot"/>
-      </p:par>
-    </p:tnLst>
-  </p:timing>
 </p:sldLayout>
 </file>
 
@@ -1854,10 +1791,9 @@
           <a:lstStyle/>
           <a:p>
             <a:r>
-              <a:rPr lang="en-US" dirty="1" smtClean="0"/>
+              <a:rPr lang="en-US"/>
               <a:t>Click to edit Master title style</a:t>
             </a:r>
-            <a:endParaRPr lang="en-US"/>
           </a:p>
         </p:txBody>
       </p:sp>
@@ -1920,7 +1856,7 @@
           <a:p>
             <a:pPr lvl="0"/>
             <a:r>
-              <a:rPr lang="en-US" dirty="1" smtClean="0"/>
+              <a:rPr lang="en-US"/>
               <a:t>Click to edit Master text styles</a:t>
             </a:r>
           </a:p>
@@ -1933,7 +1869,7 @@
             <a:spLocks noGrp="1"/>
           </p:cNvSpPr>
           <p:nvPr>
-            <p:ph type="obj" sz="half" idx="2"/>
+            <p:ph sz="half" idx="2"/>
           </p:nvPr>
         </p:nvSpPr>
         <p:spPr>
@@ -1948,38 +1884,37 @@
           <a:p>
             <a:pPr lvl="0"/>
             <a:r>
-              <a:rPr lang="en-US" dirty="1" smtClean="0"/>
+              <a:rPr lang="en-US"/>
               <a:t>Click to edit Master text styles</a:t>
             </a:r>
           </a:p>
           <a:p>
             <a:pPr lvl="1"/>
             <a:r>
-              <a:rPr lang="en-US" dirty="1" smtClean="0"/>
+              <a:rPr lang="en-US"/>
               <a:t>Second level</a:t>
             </a:r>
           </a:p>
           <a:p>
             <a:pPr lvl="2"/>
             <a:r>
-              <a:rPr lang="en-US" dirty="1" smtClean="0"/>
+              <a:rPr lang="en-US"/>
               <a:t>Third level</a:t>
             </a:r>
           </a:p>
           <a:p>
             <a:pPr lvl="3"/>
             <a:r>
-              <a:rPr lang="en-US" dirty="1" smtClean="0"/>
+              <a:rPr lang="en-US"/>
               <a:t>Fourth level</a:t>
             </a:r>
           </a:p>
           <a:p>
             <a:pPr lvl="4"/>
             <a:r>
-              <a:rPr lang="en-US" dirty="1" smtClean="0"/>
+              <a:rPr lang="en-US"/>
               <a:t>Fifth level</a:t>
             </a:r>
-            <a:endParaRPr lang="en-US"/>
           </a:p>
         </p:txBody>
       </p:sp>
@@ -2042,7 +1977,7 @@
           <a:p>
             <a:pPr lvl="0"/>
             <a:r>
-              <a:rPr lang="en-US" dirty="1" smtClean="0"/>
+              <a:rPr lang="en-US"/>
               <a:t>Click to edit Master text styles</a:t>
             </a:r>
           </a:p>
@@ -2055,7 +1990,7 @@
             <a:spLocks noGrp="1"/>
           </p:cNvSpPr>
           <p:nvPr>
-            <p:ph type="obj" sz="quarter" idx="4"/>
+            <p:ph sz="quarter" idx="4"/>
           </p:nvPr>
         </p:nvSpPr>
         <p:spPr>
@@ -2070,38 +2005,37 @@
           <a:p>
             <a:pPr lvl="0"/>
             <a:r>
-              <a:rPr lang="en-US" dirty="1" smtClean="0"/>
+              <a:rPr lang="en-US"/>
               <a:t>Click to edit Master text styles</a:t>
             </a:r>
           </a:p>
           <a:p>
             <a:pPr lvl="1"/>
             <a:r>
-              <a:rPr lang="en-US" dirty="1" smtClean="0"/>
+              <a:rPr lang="en-US"/>
               <a:t>Second level</a:t>
             </a:r>
           </a:p>
           <a:p>
             <a:pPr lvl="2"/>
             <a:r>
-              <a:rPr lang="en-US" dirty="1" smtClean="0"/>
+              <a:rPr lang="en-US"/>
               <a:t>Third level</a:t>
             </a:r>
           </a:p>
           <a:p>
             <a:pPr lvl="3"/>
             <a:r>
-              <a:rPr lang="en-US" dirty="1" smtClean="0"/>
+              <a:rPr lang="en-US"/>
               <a:t>Fourth level</a:t>
             </a:r>
           </a:p>
           <a:p>
             <a:pPr lvl="4"/>
             <a:r>
-              <a:rPr lang="en-US" dirty="1" smtClean="0"/>
+              <a:rPr lang="en-US"/>
               <a:t>Fifth level</a:t>
             </a:r>
-            <a:endParaRPr lang="en-US"/>
           </a:p>
         </p:txBody>
       </p:sp>
@@ -2122,7 +2056,7 @@
           <a:p>
             <a:fld id="{DFC38CE7-3C27-4225-9194-9B27B74ACB3B}" type="datetimeFigureOut">
               <a:rPr lang="en-US" smtClean="0"/>
-              <a:t>1/14/2016</a:t>
+              <a:t>1/30/2018</a:t>
             </a:fld>
             <a:endParaRPr lang="en-US"/>
           </a:p>
@@ -2164,7 +2098,7 @@
           <a:p>
             <a:fld id="{E87EF853-8C0C-4258-AABE-042B01E2ACC4}" type="slidenum">
               <a:rPr lang="en-US" smtClean="0"/>
-              <a:t>‹#›</a:t>
+              <a:t>‹Nº›</a:t>
             </a:fld>
             <a:endParaRPr lang="en-US"/>
           </a:p>
@@ -2180,13 +2114,6 @@
   <p:clrMapOvr>
     <a:masterClrMapping/>
   </p:clrMapOvr>
-  <p:timing>
-    <p:tnLst>
-      <p:par>
-        <p:cTn id="1" dur="indefinite" restart="never" nodeType="tmRoot"/>
-      </p:par>
-    </p:tnLst>
-  </p:timing>
 </p:sldLayout>
 </file>
 
@@ -2223,10 +2150,9 @@
           <a:lstStyle/>
           <a:p>
             <a:r>
-              <a:rPr lang="en-US" dirty="1" smtClean="0"/>
+              <a:rPr lang="en-US"/>
               <a:t>Click to edit Master title style</a:t>
             </a:r>
-            <a:endParaRPr lang="en-US"/>
           </a:p>
         </p:txBody>
       </p:sp>
@@ -2247,7 +2173,7 @@
           <a:p>
             <a:fld id="{DFC38CE7-3C27-4225-9194-9B27B74ACB3B}" type="datetimeFigureOut">
               <a:rPr lang="en-US" smtClean="0"/>
-              <a:t>1/14/2016</a:t>
+              <a:t>1/30/2018</a:t>
             </a:fld>
             <a:endParaRPr lang="en-US"/>
           </a:p>
@@ -2289,7 +2215,7 @@
           <a:p>
             <a:fld id="{E87EF853-8C0C-4258-AABE-042B01E2ACC4}" type="slidenum">
               <a:rPr lang="en-US" smtClean="0"/>
-              <a:t>‹#›</a:t>
+              <a:t>‹Nº›</a:t>
             </a:fld>
             <a:endParaRPr lang="en-US"/>
           </a:p>
@@ -2305,13 +2231,6 @@
   <p:clrMapOvr>
     <a:masterClrMapping/>
   </p:clrMapOvr>
-  <p:timing>
-    <p:tnLst>
-      <p:par>
-        <p:cTn id="1" dur="indefinite" restart="never" nodeType="tmRoot"/>
-      </p:par>
-    </p:tnLst>
-  </p:timing>
 </p:sldLayout>
 </file>
 
@@ -2349,7 +2268,7 @@
           <a:p>
             <a:fld id="{DFC38CE7-3C27-4225-9194-9B27B74ACB3B}" type="datetimeFigureOut">
               <a:rPr lang="en-US" smtClean="0"/>
-              <a:t>1/14/2016</a:t>
+              <a:t>1/30/2018</a:t>
             </a:fld>
             <a:endParaRPr lang="en-US"/>
           </a:p>
@@ -2391,7 +2310,7 @@
           <a:p>
             <a:fld id="{E87EF853-8C0C-4258-AABE-042B01E2ACC4}" type="slidenum">
               <a:rPr lang="en-US" smtClean="0"/>
-              <a:t>‹#›</a:t>
+              <a:t>‹Nº›</a:t>
             </a:fld>
             <a:endParaRPr lang="en-US"/>
           </a:p>
@@ -2407,13 +2326,6 @@
   <p:clrMapOvr>
     <a:masterClrMapping/>
   </p:clrMapOvr>
-  <p:timing>
-    <p:tnLst>
-      <p:par>
-        <p:cTn id="1" dur="indefinite" restart="never" nodeType="tmRoot"/>
-      </p:par>
-    </p:tnLst>
-  </p:timing>
 </p:sldLayout>
 </file>
 
@@ -2459,10 +2371,9 @@
           </a:lstStyle>
           <a:p>
             <a:r>
-              <a:rPr lang="en-US" dirty="1" smtClean="0"/>
+              <a:rPr lang="en-US"/>
               <a:t>Click to edit Master title style</a:t>
             </a:r>
-            <a:endParaRPr lang="en-US"/>
           </a:p>
         </p:txBody>
       </p:sp>
@@ -2473,7 +2384,7 @@
             <a:spLocks noGrp="1"/>
           </p:cNvSpPr>
           <p:nvPr>
-            <p:ph type="obj" idx="1"/>
+            <p:ph idx="1"/>
           </p:nvPr>
         </p:nvSpPr>
         <p:spPr>
@@ -2516,38 +2427,37 @@
           <a:p>
             <a:pPr lvl="0"/>
             <a:r>
-              <a:rPr lang="en-US" dirty="1" smtClean="0"/>
+              <a:rPr lang="en-US"/>
               <a:t>Click to edit Master text styles</a:t>
             </a:r>
           </a:p>
           <a:p>
             <a:pPr lvl="1"/>
             <a:r>
-              <a:rPr lang="en-US" dirty="1" smtClean="0"/>
+              <a:rPr lang="en-US"/>
               <a:t>Second level</a:t>
             </a:r>
           </a:p>
           <a:p>
             <a:pPr lvl="2"/>
             <a:r>
-              <a:rPr lang="en-US" dirty="1" smtClean="0"/>
+              <a:rPr lang="en-US"/>
               <a:t>Third level</a:t>
             </a:r>
           </a:p>
           <a:p>
             <a:pPr lvl="3"/>
             <a:r>
-              <a:rPr lang="en-US" dirty="1" smtClean="0"/>
+              <a:rPr lang="en-US"/>
               <a:t>Fourth level</a:t>
             </a:r>
           </a:p>
           <a:p>
             <a:pPr lvl="4"/>
             <a:r>
-              <a:rPr lang="en-US" dirty="1" smtClean="0"/>
+              <a:rPr lang="en-US"/>
               <a:t>Fifth level</a:t>
             </a:r>
-            <a:endParaRPr lang="en-US"/>
           </a:p>
         </p:txBody>
       </p:sp>
@@ -2610,7 +2520,7 @@
           <a:p>
             <a:pPr lvl="0"/>
             <a:r>
-              <a:rPr lang="en-US" dirty="1" smtClean="0"/>
+              <a:rPr lang="en-US"/>
               <a:t>Click to edit Master text styles</a:t>
             </a:r>
           </a:p>
@@ -2633,7 +2543,7 @@
           <a:p>
             <a:fld id="{DFC38CE7-3C27-4225-9194-9B27B74ACB3B}" type="datetimeFigureOut">
               <a:rPr lang="en-US" smtClean="0"/>
-              <a:t>1/14/2016</a:t>
+              <a:t>1/30/2018</a:t>
             </a:fld>
             <a:endParaRPr lang="en-US"/>
           </a:p>
@@ -2675,7 +2585,7 @@
           <a:p>
             <a:fld id="{E87EF853-8C0C-4258-AABE-042B01E2ACC4}" type="slidenum">
               <a:rPr lang="en-US" smtClean="0"/>
-              <a:t>‹#›</a:t>
+              <a:t>‹Nº›</a:t>
             </a:fld>
             <a:endParaRPr lang="en-US"/>
           </a:p>
@@ -2691,13 +2601,6 @@
   <p:clrMapOvr>
     <a:masterClrMapping/>
   </p:clrMapOvr>
-  <p:timing>
-    <p:tnLst>
-      <p:par>
-        <p:cTn id="1" dur="indefinite" restart="never" nodeType="tmRoot"/>
-      </p:par>
-    </p:tnLst>
-  </p:timing>
 </p:sldLayout>
 </file>
 
@@ -2743,10 +2646,9 @@
           </a:lstStyle>
           <a:p>
             <a:r>
-              <a:rPr lang="en-US" dirty="1" smtClean="0"/>
+              <a:rPr lang="en-US"/>
               <a:t>Click to edit Master title style</a:t>
             </a:r>
-            <a:endParaRPr lang="en-US"/>
           </a:p>
         </p:txBody>
       </p:sp>
@@ -2808,10 +2710,9 @@
           </a:lstStyle>
           <a:p>
             <a:r>
-              <a:rPr lang="en-US" dirty="1" smtClean="0"/>
+              <a:rPr lang="en-US"/>
               <a:t>Click icon to add picture</a:t>
             </a:r>
-            <a:endParaRPr lang="en-US"/>
           </a:p>
         </p:txBody>
       </p:sp>
@@ -2874,7 +2775,7 @@
           <a:p>
             <a:pPr lvl="0"/>
             <a:r>
-              <a:rPr lang="en-US" dirty="1" smtClean="0"/>
+              <a:rPr lang="en-US"/>
               <a:t>Click to edit Master text styles</a:t>
             </a:r>
           </a:p>
@@ -2897,7 +2798,7 @@
           <a:p>
             <a:fld id="{DFC38CE7-3C27-4225-9194-9B27B74ACB3B}" type="datetimeFigureOut">
               <a:rPr lang="en-US" smtClean="0"/>
-              <a:t>1/14/2016</a:t>
+              <a:t>1/30/2018</a:t>
             </a:fld>
             <a:endParaRPr lang="en-US"/>
           </a:p>
@@ -2939,7 +2840,7 @@
           <a:p>
             <a:fld id="{E87EF853-8C0C-4258-AABE-042B01E2ACC4}" type="slidenum">
               <a:rPr lang="en-US" smtClean="0"/>
-              <a:t>‹#›</a:t>
+              <a:t>‹Nº›</a:t>
             </a:fld>
             <a:endParaRPr lang="en-US"/>
           </a:p>
@@ -2955,19 +2856,12 @@
   <p:clrMapOvr>
     <a:masterClrMapping/>
   </p:clrMapOvr>
-  <p:timing>
-    <p:tnLst>
-      <p:par>
-        <p:cTn id="1" dur="indefinite" restart="never" nodeType="tmRoot"/>
-      </p:par>
-    </p:tnLst>
-  </p:timing>
 </p:sldLayout>
 </file>
 
 <file path=ppt/slideMasters/slideMaster1.xml><?xml version="1.0" encoding="utf-8"?>
 <p:sldMaster xmlns:a="http://schemas.openxmlformats.org/drawingml/2006/main" xmlns:r="http://schemas.openxmlformats.org/officeDocument/2006/relationships" xmlns:p="http://schemas.openxmlformats.org/presentationml/2006/main">
-  <p:cSld name="">
+  <p:cSld>
     <p:bg>
       <p:bgRef idx="1001">
         <a:schemeClr val="bg1"/>
@@ -3012,7 +2906,9 @@
               <a:off x="0" y="-1898"/>
               <a:ext cx="12192000" cy="1495650"/>
             </a:xfrm>
-            <a:prstGeom prst="rect"/>
+            <a:prstGeom prst="rect">
+              <a:avLst/>
+            </a:prstGeom>
             <a:solidFill>
               <a:srgbClr val="1D599E"/>
             </a:solidFill>
@@ -3034,7 +2930,7 @@
                 <a:buNone/>
               </a:pPr>
               <a:r>
-                <a:rPr lang="en-US" sz="1800" b="0" i="0" u="none" strike="noStrike" cap="none" baseline="0" dirty="1">
+                <a:rPr lang="en-US" sz="1800" b="0" i="0" u="none" strike="noStrike" cap="none" baseline="0">
                   <a:solidFill>
                     <a:schemeClr val="lt1"/>
                   </a:solidFill>
@@ -3059,7 +2955,9 @@
               <a:off x="2328" y="1393803"/>
               <a:ext cx="12192000" cy="212724"/>
             </a:xfrm>
-            <a:prstGeom prst="rect"/>
+            <a:prstGeom prst="rect">
+              <a:avLst/>
+            </a:prstGeom>
             <a:solidFill>
               <a:srgbClr val="F5A10F"/>
             </a:solidFill>
@@ -3107,7 +3005,9 @@
             <a:off x="838200" y="17120"/>
             <a:ext cx="10515600" cy="1237250"/>
           </a:xfrm>
-          <a:prstGeom prst="rect"/>
+          <a:prstGeom prst="rect">
+            <a:avLst/>
+          </a:prstGeom>
         </p:spPr>
         <p:txBody>
           <a:bodyPr vert="horz" lIns="91440" tIns="45720" rIns="91440" bIns="45720" rtlCol="0" anchor="ctr">
@@ -3133,10 +3033,9 @@
               <a:buNone/>
             </a:pPr>
             <a:r>
-              <a:rPr lang="en-US" dirty="1" smtClean="0"/>
+              <a:rPr lang="en-US"/>
               <a:t>Click to edit Master title style</a:t>
             </a:r>
-            <a:endParaRPr lang="en-US"/>
           </a:p>
         </p:txBody>
       </p:sp>
@@ -3155,7 +3054,9 @@
             <a:off x="838200" y="1535722"/>
             <a:ext cx="10515600" cy="4825245"/>
           </a:xfrm>
-          <a:prstGeom prst="rect"/>
+          <a:prstGeom prst="rect">
+            <a:avLst/>
+          </a:prstGeom>
         </p:spPr>
         <p:txBody>
           <a:bodyPr vert="horz" lIns="91440" tIns="45720" rIns="91440" bIns="45720" rtlCol="0">
@@ -3165,38 +3066,37 @@
           <a:p>
             <a:pPr lvl="0"/>
             <a:r>
-              <a:rPr lang="en-US" dirty="1" smtClean="0"/>
+              <a:rPr lang="en-US"/>
               <a:t>Click to edit Master text styles</a:t>
             </a:r>
           </a:p>
           <a:p>
             <a:pPr lvl="1"/>
             <a:r>
-              <a:rPr lang="en-US" dirty="1" smtClean="0"/>
+              <a:rPr lang="en-US"/>
               <a:t>Second level</a:t>
             </a:r>
           </a:p>
           <a:p>
             <a:pPr lvl="2"/>
             <a:r>
-              <a:rPr lang="en-US" dirty="1" smtClean="0"/>
+              <a:rPr lang="en-US"/>
               <a:t>Third level</a:t>
             </a:r>
           </a:p>
           <a:p>
             <a:pPr lvl="3"/>
             <a:r>
-              <a:rPr lang="en-US" dirty="1" smtClean="0"/>
+              <a:rPr lang="en-US"/>
               <a:t>Fourth level</a:t>
             </a:r>
           </a:p>
           <a:p>
             <a:pPr lvl="4"/>
             <a:r>
-              <a:rPr lang="en-US" dirty="1" smtClean="0"/>
+              <a:rPr lang="en-US"/>
               <a:t>Fifth level</a:t>
             </a:r>
-            <a:endParaRPr lang="en-US"/>
           </a:p>
         </p:txBody>
       </p:sp>
@@ -3215,7 +3115,9 @@
             <a:off x="2632387" y="6462482"/>
             <a:ext cx="949012" cy="365125"/>
           </a:xfrm>
-          <a:prstGeom prst="rect"/>
+          <a:prstGeom prst="rect">
+            <a:avLst/>
+          </a:prstGeom>
         </p:spPr>
         <p:txBody>
           <a:bodyPr vert="horz" lIns="91440" tIns="45720" rIns="91440" bIns="45720" rtlCol="0" anchor="ctr"/>
@@ -3233,7 +3135,7 @@
           <a:p>
             <a:fld id="{DFC38CE7-3C27-4225-9194-9B27B74ACB3B}" type="datetimeFigureOut">
               <a:rPr lang="en-US" smtClean="0"/>
-              <a:t>1/14/2016</a:t>
+              <a:t>1/30/2018</a:t>
             </a:fld>
             <a:endParaRPr lang="en-US"/>
           </a:p>
@@ -3254,7 +3156,9 @@
             <a:off x="4038600" y="6462482"/>
             <a:ext cx="4114800" cy="365125"/>
           </a:xfrm>
-          <a:prstGeom prst="rect"/>
+          <a:prstGeom prst="rect">
+            <a:avLst/>
+          </a:prstGeom>
         </p:spPr>
         <p:txBody>
           <a:bodyPr vert="horz" lIns="91440" tIns="45720" rIns="91440" bIns="45720" rtlCol="0" anchor="ctr"/>
@@ -3289,7 +3193,9 @@
             <a:off x="8610600" y="6462482"/>
             <a:ext cx="2743200" cy="365125"/>
           </a:xfrm>
-          <a:prstGeom prst="rect"/>
+          <a:prstGeom prst="rect">
+            <a:avLst/>
+          </a:prstGeom>
         </p:spPr>
         <p:txBody>
           <a:bodyPr vert="horz" lIns="91440" tIns="45720" rIns="91440" bIns="45720" rtlCol="0" anchor="ctr"/>
@@ -3307,7 +3213,7 @@
           <a:p>
             <a:fld id="{E87EF853-8C0C-4258-AABE-042B01E2ACC4}" type="slidenum">
               <a:rPr lang="en-US" smtClean="0"/>
-              <a:t>‹#›</a:t>
+              <a:t>‹Nº›</a:t>
             </a:fld>
             <a:endParaRPr lang="en-US"/>
           </a:p>
@@ -3333,7 +3239,9 @@
             <a:off x="58253" y="6465580"/>
             <a:ext cx="2116934" cy="362027"/>
           </a:xfrm>
-          <a:prstGeom prst="rect"/>
+          <a:prstGeom prst="rect">
+            <a:avLst/>
+          </a:prstGeom>
           <a:noFill/>
           <a:ln>
             <a:noFill/>
@@ -3363,13 +3271,6 @@
     <p:sldLayoutId id="2147483673" r:id="rId12"/>
     <p:sldLayoutId id="2147483672" r:id="rId13"/>
   </p:sldLayoutIdLst>
-  <p:timing>
-    <p:tnLst>
-      <p:par>
-        <p:cTn id="1" dur="indefinite" restart="never" nodeType="tmRoot"/>
-      </p:par>
-    </p:tnLst>
-  </p:timing>
   <p:txStyles>
     <p:titleStyle>
       <a:lvl1pPr algn="l" defTabSz="914400" rtl="0" eaLnBrk="1" latinLnBrk="0" hangingPunct="1">
@@ -3399,7 +3300,7 @@
         <a:spcBef>
           <a:spcPts val="1000"/>
         </a:spcBef>
-        <a:buFont typeface="Arial" panose="020b0604020202020204" pitchFamily="34" charset="0"/>
+        <a:buFont typeface="Arial" panose="020B0604020202020204" pitchFamily="34" charset="0"/>
         <a:buChar char="•"/>
         <a:defRPr sz="2800" kern="1200">
           <a:solidFill>
@@ -3417,7 +3318,7 @@
         <a:spcBef>
           <a:spcPts val="500"/>
         </a:spcBef>
-        <a:buFont typeface="Arial" panose="020b0604020202020204" pitchFamily="34" charset="0"/>
+        <a:buFont typeface="Arial" panose="020B0604020202020204" pitchFamily="34" charset="0"/>
         <a:buChar char="•"/>
         <a:defRPr sz="2400" kern="1200">
           <a:solidFill>
@@ -3435,7 +3336,7 @@
         <a:spcBef>
           <a:spcPts val="500"/>
         </a:spcBef>
-        <a:buFont typeface="Arial" panose="020b0604020202020204" pitchFamily="34" charset="0"/>
+        <a:buFont typeface="Arial" panose="020B0604020202020204" pitchFamily="34" charset="0"/>
         <a:buChar char="•"/>
         <a:defRPr sz="2000" kern="1200">
           <a:solidFill>
@@ -3453,7 +3354,7 @@
         <a:spcBef>
           <a:spcPts val="500"/>
         </a:spcBef>
-        <a:buFont typeface="Arial" panose="020b0604020202020204" pitchFamily="34" charset="0"/>
+        <a:buFont typeface="Arial" panose="020B0604020202020204" pitchFamily="34" charset="0"/>
         <a:buChar char="•"/>
         <a:defRPr sz="1800" kern="1200">
           <a:solidFill>
@@ -3471,7 +3372,7 @@
         <a:spcBef>
           <a:spcPts val="500"/>
         </a:spcBef>
-        <a:buFont typeface="Arial" panose="020b0604020202020204" pitchFamily="34" charset="0"/>
+        <a:buFont typeface="Arial" panose="020B0604020202020204" pitchFamily="34" charset="0"/>
         <a:buChar char="•"/>
         <a:defRPr sz="1800" kern="1200">
           <a:solidFill>
@@ -3489,7 +3390,7 @@
         <a:spcBef>
           <a:spcPts val="500"/>
         </a:spcBef>
-        <a:buFont typeface="Arial" panose="020b0604020202020204" pitchFamily="34" charset="0"/>
+        <a:buFont typeface="Arial" panose="020B0604020202020204" pitchFamily="34" charset="0"/>
         <a:buChar char="•"/>
         <a:defRPr sz="1800" kern="1200">
           <a:solidFill>
@@ -3507,7 +3408,7 @@
         <a:spcBef>
           <a:spcPts val="500"/>
         </a:spcBef>
-        <a:buFont typeface="Arial" panose="020b0604020202020204" pitchFamily="34" charset="0"/>
+        <a:buFont typeface="Arial" panose="020B0604020202020204" pitchFamily="34" charset="0"/>
         <a:buChar char="•"/>
         <a:defRPr sz="1800" kern="1200">
           <a:solidFill>
@@ -3525,7 +3426,7 @@
         <a:spcBef>
           <a:spcPts val="500"/>
         </a:spcBef>
-        <a:buFont typeface="Arial" panose="020b0604020202020204" pitchFamily="34" charset="0"/>
+        <a:buFont typeface="Arial" panose="020B0604020202020204" pitchFamily="34" charset="0"/>
         <a:buChar char="•"/>
         <a:defRPr sz="1800" kern="1200">
           <a:solidFill>
@@ -3543,7 +3444,7 @@
         <a:spcBef>
           <a:spcPts val="500"/>
         </a:spcBef>
-        <a:buFont typeface="Arial" panose="020b0604020202020204" pitchFamily="34" charset="0"/>
+        <a:buFont typeface="Arial" panose="020B0604020202020204" pitchFamily="34" charset="0"/>
         <a:buChar char="•"/>
         <a:defRPr sz="1800" kern="1200">
           <a:solidFill>
@@ -3656,7 +3557,7 @@
 
 <file path=ppt/slides/slide1.xml><?xml version="1.0" encoding="utf-8"?>
 <p:sld xmlns:a="http://schemas.openxmlformats.org/drawingml/2006/main" xmlns:r="http://schemas.openxmlformats.org/officeDocument/2006/relationships" xmlns:p="http://schemas.openxmlformats.org/presentationml/2006/main">
-  <p:cSld name="">
+  <p:cSld>
     <p:spTree>
       <p:nvGrpSpPr>
         <p:cNvPr id="1" name=""/>
@@ -3681,14 +3582,31 @@
             <p:ph type="ctrTitle"/>
           </p:nvPr>
         </p:nvSpPr>
-        <p:spPr/>
-        <p:txBody>
-          <a:bodyPr/>
-          <a:lstStyle/>
-          <a:p>
-            <a:r>
-              <a:t>Enunciado de patrones</a:t>
-            </a:r>
+        <p:spPr>
+          <a:xfrm>
+            <a:off x="2946456" y="763104"/>
+            <a:ext cx="9144000" cy="2387600"/>
+          </a:xfrm>
+        </p:spPr>
+        <p:txBody>
+          <a:bodyPr/>
+          <a:lstStyle/>
+          <a:p>
+            <a:r>
+              <a:rPr lang="es-ES" b="1" dirty="0">
+                <a:solidFill>
+                  <a:srgbClr val="002060"/>
+                </a:solidFill>
+                <a:latin typeface="Bookman Old Style" panose="02050604050505020204" pitchFamily="18" charset="0"/>
+              </a:rPr>
+              <a:t>Enunciemos los patrones</a:t>
+            </a:r>
+            <a:endParaRPr b="1" dirty="0">
+              <a:solidFill>
+                <a:srgbClr val="002060"/>
+              </a:solidFill>
+              <a:latin typeface="Bookman Old Style" panose="02050604050505020204" pitchFamily="18" charset="0"/>
+            </a:endParaRPr>
           </a:p>
         </p:txBody>
       </p:sp>
@@ -3702,50 +3620,269 @@
             <p:ph type="subTitle" idx="1"/>
           </p:nvPr>
         </p:nvSpPr>
-        <p:spPr/>
-        <p:txBody>
-          <a:bodyPr/>
-          <a:lstStyle/>
-          <a:p>
-            <a:endParaRPr lang="en-US"/>
+        <p:spPr>
+          <a:xfrm>
+            <a:off x="3167270" y="3151687"/>
+            <a:ext cx="9144000" cy="1655762"/>
+          </a:xfrm>
+        </p:spPr>
+        <p:txBody>
+          <a:bodyPr>
+            <a:normAutofit/>
+          </a:bodyPr>
+          <a:lstStyle/>
+          <a:p>
+            <a:r>
+              <a:rPr lang="en-US" sz="3000" b="1" dirty="0"/>
+              <a:t>Eolic Event Consumer</a:t>
+            </a:r>
           </a:p>
         </p:txBody>
       </p:sp>
       <p:pic>
         <p:nvPicPr>
-          <p:cNvPr id="5" name="Picture 4"/>
+          <p:cNvPr id="1026" name="Picture 2" descr="Resultado de imagen de aerogenerador png">
+            <a:extLst>
+              <a:ext uri="{FF2B5EF4-FFF2-40B4-BE49-F238E27FC236}">
+                <a16:creationId xmlns:a16="http://schemas.microsoft.com/office/drawing/2014/main" id="{20CFD2B9-CED5-40D4-9D3E-7D0A934153C9}"/>
+              </a:ext>
+            </a:extLst>
+          </p:cNvPr>
           <p:cNvPicPr>
-            <a:picLocks noChangeAspect="1"/>
+            <a:picLocks noChangeAspect="1" noChangeArrowheads="1"/>
           </p:cNvPicPr>
           <p:nvPr/>
         </p:nvPicPr>
-        <p:blipFill>
-          <a:blip r:embed="rId2"/>
-          <a:srcRect/>
-          <a:stretch>
-            <a:fillRect/>
-          </a:stretch>
+        <p:blipFill rotWithShape="1">
+          <a:blip r:embed="rId2">
+            <a:extLst>
+              <a:ext uri="{28A0092B-C50C-407E-A947-70E740481C1C}">
+                <a14:useLocalDpi xmlns:a14="http://schemas.microsoft.com/office/drawing/2010/main" val="0"/>
+              </a:ext>
+            </a:extLst>
+          </a:blip>
+          <a:srcRect l="-809" r="-809"/>
+          <a:stretch/>
         </p:blipFill>
-        <p:spPr>
-          <a:xfrm>
-            <a:off x="6096000" y="5679235"/>
-            <a:ext cx="5861934" cy="1002476"/>
-          </a:xfrm>
-          <a:prstGeom prst="rect"/>
-          <a:effectLst>
-            <a:glow>
-              <a:schemeClr val="tx1">
-                <a:alpha val="20000"/>
-              </a:schemeClr>
-            </a:glow>
-            <a:outerShdw blurRad="381000" dir="5400000" dist="266700" algn="ctr" rotWithShape="0">
-              <a:schemeClr val="bg1">
-                <a:alpha val="55000"/>
-              </a:schemeClr>
-            </a:outerShdw>
-          </a:effectLst>
+        <p:spPr bwMode="auto">
+          <a:xfrm>
+            <a:off x="-310398" y="2332384"/>
+            <a:ext cx="5605885" cy="4710354"/>
+          </a:xfrm>
+          <a:prstGeom prst="flowChartAlternateProcess">
+            <a:avLst/>
+          </a:prstGeom>
+          <a:noFill/>
+          <a:extLst>
+            <a:ext uri="{909E8E84-426E-40DD-AFC4-6F175D3DCCD1}">
+              <a14:hiddenFill xmlns:a14="http://schemas.microsoft.com/office/drawing/2010/main">
+                <a:solidFill>
+                  <a:srgbClr val="FFFFFF"/>
+                </a:solidFill>
+              </a14:hiddenFill>
+            </a:ext>
+          </a:extLst>
         </p:spPr>
       </p:pic>
+      <p:sp>
+        <p:nvSpPr>
+          <p:cNvPr id="6" name="Subtitle 2">
+            <a:extLst>
+              <a:ext uri="{FF2B5EF4-FFF2-40B4-BE49-F238E27FC236}">
+                <a16:creationId xmlns:a16="http://schemas.microsoft.com/office/drawing/2014/main" id="{1AA95BB7-1599-4057-84B8-D9CEF8D22C00}"/>
+              </a:ext>
+            </a:extLst>
+          </p:cNvPr>
+          <p:cNvSpPr txBox="1">
+            <a:spLocks/>
+          </p:cNvSpPr>
+          <p:nvPr/>
+        </p:nvSpPr>
+        <p:spPr>
+          <a:xfrm>
+            <a:off x="8138905" y="6094896"/>
+            <a:ext cx="4459357" cy="1381539"/>
+          </a:xfrm>
+          <a:prstGeom prst="rect">
+            <a:avLst/>
+          </a:prstGeom>
+        </p:spPr>
+        <p:txBody>
+          <a:bodyPr vert="horz" lIns="91440" tIns="45720" rIns="91440" bIns="45720" rtlCol="0">
+            <a:normAutofit/>
+          </a:bodyPr>
+          <a:lstStyle>
+            <a:lvl1pPr marL="0" indent="0" algn="ctr" defTabSz="914400" rtl="0" eaLnBrk="1" latinLnBrk="0" hangingPunct="1">
+              <a:lnSpc>
+                <a:spcPct val="90000"/>
+              </a:lnSpc>
+              <a:spcBef>
+                <a:spcPts val="1000"/>
+              </a:spcBef>
+              <a:buFont typeface="Arial" panose="020B0604020202020204" pitchFamily="34" charset="0"/>
+              <a:buNone/>
+              <a:defRPr sz="2400" kern="1200">
+                <a:solidFill>
+                  <a:schemeClr val="tx1"/>
+                </a:solidFill>
+                <a:latin typeface="+mn-lt"/>
+                <a:ea typeface="+mn-ea"/>
+                <a:cs typeface="+mn-cs"/>
+              </a:defRPr>
+            </a:lvl1pPr>
+            <a:lvl2pPr marL="457200" indent="0" algn="ctr" defTabSz="914400" rtl="0" eaLnBrk="1" latinLnBrk="0" hangingPunct="1">
+              <a:lnSpc>
+                <a:spcPct val="90000"/>
+              </a:lnSpc>
+              <a:spcBef>
+                <a:spcPts val="500"/>
+              </a:spcBef>
+              <a:buFont typeface="Arial" panose="020B0604020202020204" pitchFamily="34" charset="0"/>
+              <a:buNone/>
+              <a:defRPr sz="2000" kern="1200">
+                <a:solidFill>
+                  <a:schemeClr val="tx1"/>
+                </a:solidFill>
+                <a:latin typeface="+mn-lt"/>
+                <a:ea typeface="+mn-ea"/>
+                <a:cs typeface="+mn-cs"/>
+              </a:defRPr>
+            </a:lvl2pPr>
+            <a:lvl3pPr marL="914400" indent="0" algn="ctr" defTabSz="914400" rtl="0" eaLnBrk="1" latinLnBrk="0" hangingPunct="1">
+              <a:lnSpc>
+                <a:spcPct val="90000"/>
+              </a:lnSpc>
+              <a:spcBef>
+                <a:spcPts val="500"/>
+              </a:spcBef>
+              <a:buFont typeface="Arial" panose="020B0604020202020204" pitchFamily="34" charset="0"/>
+              <a:buNone/>
+              <a:defRPr sz="1800" kern="1200">
+                <a:solidFill>
+                  <a:schemeClr val="tx1"/>
+                </a:solidFill>
+                <a:latin typeface="+mn-lt"/>
+                <a:ea typeface="+mn-ea"/>
+                <a:cs typeface="+mn-cs"/>
+              </a:defRPr>
+            </a:lvl3pPr>
+            <a:lvl4pPr marL="1371600" indent="0" algn="ctr" defTabSz="914400" rtl="0" eaLnBrk="1" latinLnBrk="0" hangingPunct="1">
+              <a:lnSpc>
+                <a:spcPct val="90000"/>
+              </a:lnSpc>
+              <a:spcBef>
+                <a:spcPts val="500"/>
+              </a:spcBef>
+              <a:buFont typeface="Arial" panose="020B0604020202020204" pitchFamily="34" charset="0"/>
+              <a:buNone/>
+              <a:defRPr sz="1600" kern="1200">
+                <a:solidFill>
+                  <a:schemeClr val="tx1"/>
+                </a:solidFill>
+                <a:latin typeface="+mn-lt"/>
+                <a:ea typeface="+mn-ea"/>
+                <a:cs typeface="+mn-cs"/>
+              </a:defRPr>
+            </a:lvl4pPr>
+            <a:lvl5pPr marL="1828800" indent="0" algn="ctr" defTabSz="914400" rtl="0" eaLnBrk="1" latinLnBrk="0" hangingPunct="1">
+              <a:lnSpc>
+                <a:spcPct val="90000"/>
+              </a:lnSpc>
+              <a:spcBef>
+                <a:spcPts val="500"/>
+              </a:spcBef>
+              <a:buFont typeface="Arial" panose="020B0604020202020204" pitchFamily="34" charset="0"/>
+              <a:buNone/>
+              <a:defRPr sz="1600" kern="1200">
+                <a:solidFill>
+                  <a:schemeClr val="tx1"/>
+                </a:solidFill>
+                <a:latin typeface="+mn-lt"/>
+                <a:ea typeface="+mn-ea"/>
+                <a:cs typeface="+mn-cs"/>
+              </a:defRPr>
+            </a:lvl5pPr>
+            <a:lvl6pPr marL="2286000" indent="0" algn="ctr" defTabSz="914400" rtl="0" eaLnBrk="1" latinLnBrk="0" hangingPunct="1">
+              <a:lnSpc>
+                <a:spcPct val="90000"/>
+              </a:lnSpc>
+              <a:spcBef>
+                <a:spcPts val="500"/>
+              </a:spcBef>
+              <a:buFont typeface="Arial" panose="020B0604020202020204" pitchFamily="34" charset="0"/>
+              <a:buNone/>
+              <a:defRPr sz="1600" kern="1200">
+                <a:solidFill>
+                  <a:schemeClr val="tx1"/>
+                </a:solidFill>
+                <a:latin typeface="+mn-lt"/>
+                <a:ea typeface="+mn-ea"/>
+                <a:cs typeface="+mn-cs"/>
+              </a:defRPr>
+            </a:lvl6pPr>
+            <a:lvl7pPr marL="2743200" indent="0" algn="ctr" defTabSz="914400" rtl="0" eaLnBrk="1" latinLnBrk="0" hangingPunct="1">
+              <a:lnSpc>
+                <a:spcPct val="90000"/>
+              </a:lnSpc>
+              <a:spcBef>
+                <a:spcPts val="500"/>
+              </a:spcBef>
+              <a:buFont typeface="Arial" panose="020B0604020202020204" pitchFamily="34" charset="0"/>
+              <a:buNone/>
+              <a:defRPr sz="1600" kern="1200">
+                <a:solidFill>
+                  <a:schemeClr val="tx1"/>
+                </a:solidFill>
+                <a:latin typeface="+mn-lt"/>
+                <a:ea typeface="+mn-ea"/>
+                <a:cs typeface="+mn-cs"/>
+              </a:defRPr>
+            </a:lvl7pPr>
+            <a:lvl8pPr marL="3200400" indent="0" algn="ctr" defTabSz="914400" rtl="0" eaLnBrk="1" latinLnBrk="0" hangingPunct="1">
+              <a:lnSpc>
+                <a:spcPct val="90000"/>
+              </a:lnSpc>
+              <a:spcBef>
+                <a:spcPts val="500"/>
+              </a:spcBef>
+              <a:buFont typeface="Arial" panose="020B0604020202020204" pitchFamily="34" charset="0"/>
+              <a:buNone/>
+              <a:defRPr sz="1600" kern="1200">
+                <a:solidFill>
+                  <a:schemeClr val="tx1"/>
+                </a:solidFill>
+                <a:latin typeface="+mn-lt"/>
+                <a:ea typeface="+mn-ea"/>
+                <a:cs typeface="+mn-cs"/>
+              </a:defRPr>
+            </a:lvl8pPr>
+            <a:lvl9pPr marL="3657600" indent="0" algn="ctr" defTabSz="914400" rtl="0" eaLnBrk="1" latinLnBrk="0" hangingPunct="1">
+              <a:lnSpc>
+                <a:spcPct val="90000"/>
+              </a:lnSpc>
+              <a:spcBef>
+                <a:spcPts val="500"/>
+              </a:spcBef>
+              <a:buFont typeface="Arial" panose="020B0604020202020204" pitchFamily="34" charset="0"/>
+              <a:buNone/>
+              <a:defRPr sz="1600" kern="1200">
+                <a:solidFill>
+                  <a:schemeClr val="tx1"/>
+                </a:solidFill>
+                <a:latin typeface="+mn-lt"/>
+                <a:ea typeface="+mn-ea"/>
+                <a:cs typeface="+mn-cs"/>
+              </a:defRPr>
+            </a:lvl9pPr>
+          </a:lstStyle>
+          <a:p>
+            <a:r>
+              <a:rPr lang="en-US" b="1" dirty="0"/>
+              <a:t>Enrique Brazález Segovia</a:t>
+            </a:r>
+          </a:p>
+        </p:txBody>
+      </p:sp>
     </p:spTree>
     <p:extLst>
       <p:ext uri="{BB962C8B-B14F-4D97-AF65-F5344CB8AC3E}">
@@ -3756,19 +3893,12 @@
   <p:clrMapOvr>
     <a:masterClrMapping/>
   </p:clrMapOvr>
-  <p:timing>
-    <p:tnLst>
-      <p:par>
-        <p:cTn id="1" dur="indefinite" restart="never" nodeType="tmRoot"/>
-      </p:par>
-    </p:tnLst>
-  </p:timing>
 </p:sld>
 </file>
 
 <file path=ppt/slides/slide10.xml><?xml version="1.0" encoding="utf-8"?>
 <p:sld xmlns:a="http://schemas.openxmlformats.org/drawingml/2006/main" xmlns:r="http://schemas.openxmlformats.org/officeDocument/2006/relationships" xmlns:p="http://schemas.openxmlformats.org/presentationml/2006/main">
-  <p:cSld name="">
+  <p:cSld>
     <p:spTree>
       <p:nvGrpSpPr>
         <p:cNvPr id="1" name=""/>
@@ -3811,7 +3941,7 @@
             <a:spLocks noGrp="1"/>
           </p:cNvSpPr>
           <p:nvPr>
-            <p:ph type="obj" idx="1"/>
+            <p:ph idx="1"/>
           </p:nvPr>
         </p:nvSpPr>
         <p:spPr>
@@ -3848,7 +3978,9 @@
             <a:off x="457200" y="1536192"/>
             <a:ext cx="5340096" cy="4828032"/>
           </a:xfrm>
-          <a:prstGeom prst="rect"/>
+          <a:prstGeom prst="rect">
+            <a:avLst/>
+          </a:prstGeom>
           <a:ln>
             <a:solidFill>
               <a:schemeClr val="tx2">
@@ -3877,7 +4009,9 @@
             <a:off x="457200" y="1536192"/>
             <a:ext cx="5340096" cy="4828032"/>
           </a:xfrm>
-          <a:prstGeom prst="rect"/>
+          <a:prstGeom prst="rect">
+            <a:avLst/>
+          </a:prstGeom>
           <a:ln>
             <a:solidFill>
               <a:srgbClr val="FFFFFF"/>
@@ -3890,19 +4024,12 @@
   <p:clrMapOvr>
     <a:masterClrMapping/>
   </p:clrMapOvr>
-  <p:timing>
-    <p:tnLst>
-      <p:par>
-        <p:cTn id="1" dur="indefinite" restart="never" nodeType="tmRoot"/>
-      </p:par>
-    </p:tnLst>
-  </p:timing>
 </p:sld>
 </file>
 
 <file path=ppt/slides/slide11.xml><?xml version="1.0" encoding="utf-8"?>
 <p:sld xmlns:a="http://schemas.openxmlformats.org/drawingml/2006/main" xmlns:r="http://schemas.openxmlformats.org/officeDocument/2006/relationships" xmlns:p="http://schemas.openxmlformats.org/presentationml/2006/main">
-  <p:cSld name="">
+  <p:cSld>
     <p:spTree>
       <p:nvGrpSpPr>
         <p:cNvPr id="1" name=""/>
@@ -3945,7 +4072,7 @@
             <a:spLocks noGrp="1"/>
           </p:cNvSpPr>
           <p:nvPr>
-            <p:ph type="obj" idx="1"/>
+            <p:ph idx="1"/>
           </p:nvPr>
         </p:nvSpPr>
         <p:spPr>
@@ -3982,7 +4109,9 @@
             <a:off x="457200" y="1536192"/>
             <a:ext cx="5340096" cy="4828032"/>
           </a:xfrm>
-          <a:prstGeom prst="rect"/>
+          <a:prstGeom prst="rect">
+            <a:avLst/>
+          </a:prstGeom>
           <a:ln>
             <a:solidFill>
               <a:schemeClr val="tx2">
@@ -4011,7 +4140,9 @@
             <a:off x="457200" y="1536192"/>
             <a:ext cx="5340096" cy="4828032"/>
           </a:xfrm>
-          <a:prstGeom prst="rect"/>
+          <a:prstGeom prst="rect">
+            <a:avLst/>
+          </a:prstGeom>
           <a:ln>
             <a:solidFill>
               <a:srgbClr val="FFFFFF"/>
@@ -4024,19 +4155,12 @@
   <p:clrMapOvr>
     <a:masterClrMapping/>
   </p:clrMapOvr>
-  <p:timing>
-    <p:tnLst>
-      <p:par>
-        <p:cTn id="1" dur="indefinite" restart="never" nodeType="tmRoot"/>
-      </p:par>
-    </p:tnLst>
-  </p:timing>
 </p:sld>
 </file>
 
 <file path=ppt/slides/slide12.xml><?xml version="1.0" encoding="utf-8"?>
 <p:sld xmlns:a="http://schemas.openxmlformats.org/drawingml/2006/main" xmlns:r="http://schemas.openxmlformats.org/officeDocument/2006/relationships" xmlns:p="http://schemas.openxmlformats.org/presentationml/2006/main">
-  <p:cSld name="">
+  <p:cSld>
     <p:spTree>
       <p:nvGrpSpPr>
         <p:cNvPr id="1" name=""/>
@@ -4079,7 +4203,7 @@
             <a:spLocks noGrp="1"/>
           </p:cNvSpPr>
           <p:nvPr>
-            <p:ph type="obj" idx="1"/>
+            <p:ph idx="1"/>
           </p:nvPr>
         </p:nvSpPr>
         <p:spPr>
@@ -4116,7 +4240,9 @@
             <a:off x="457200" y="1536192"/>
             <a:ext cx="5340096" cy="4828032"/>
           </a:xfrm>
-          <a:prstGeom prst="rect"/>
+          <a:prstGeom prst="rect">
+            <a:avLst/>
+          </a:prstGeom>
           <a:ln>
             <a:solidFill>
               <a:schemeClr val="tx2">
@@ -4145,7 +4271,9 @@
             <a:off x="457200" y="1536192"/>
             <a:ext cx="5340096" cy="4828032"/>
           </a:xfrm>
-          <a:prstGeom prst="rect"/>
+          <a:prstGeom prst="rect">
+            <a:avLst/>
+          </a:prstGeom>
           <a:ln>
             <a:solidFill>
               <a:srgbClr val="FFFFFF"/>
@@ -4158,19 +4286,12 @@
   <p:clrMapOvr>
     <a:masterClrMapping/>
   </p:clrMapOvr>
-  <p:timing>
-    <p:tnLst>
-      <p:par>
-        <p:cTn id="1" dur="indefinite" restart="never" nodeType="tmRoot"/>
-      </p:par>
-    </p:tnLst>
-  </p:timing>
 </p:sld>
 </file>
 
 <file path=ppt/slides/slide13.xml><?xml version="1.0" encoding="utf-8"?>
 <p:sld xmlns:a="http://schemas.openxmlformats.org/drawingml/2006/main" xmlns:r="http://schemas.openxmlformats.org/officeDocument/2006/relationships" xmlns:p="http://schemas.openxmlformats.org/presentationml/2006/main">
-  <p:cSld name="">
+  <p:cSld>
     <p:spTree>
       <p:nvGrpSpPr>
         <p:cNvPr id="1" name=""/>
@@ -4213,7 +4334,7 @@
             <a:spLocks noGrp="1"/>
           </p:cNvSpPr>
           <p:nvPr>
-            <p:ph type="obj" idx="1"/>
+            <p:ph idx="1"/>
           </p:nvPr>
         </p:nvSpPr>
         <p:spPr>
@@ -4250,7 +4371,9 @@
             <a:off x="457200" y="1536192"/>
             <a:ext cx="5340096" cy="4828032"/>
           </a:xfrm>
-          <a:prstGeom prst="rect"/>
+          <a:prstGeom prst="rect">
+            <a:avLst/>
+          </a:prstGeom>
           <a:ln>
             <a:solidFill>
               <a:schemeClr val="tx2">
@@ -4279,7 +4402,9 @@
             <a:off x="457200" y="1536192"/>
             <a:ext cx="5340096" cy="4828032"/>
           </a:xfrm>
-          <a:prstGeom prst="rect"/>
+          <a:prstGeom prst="rect">
+            <a:avLst/>
+          </a:prstGeom>
           <a:ln>
             <a:solidFill>
               <a:srgbClr val="FFFFFF"/>
@@ -4292,19 +4417,12 @@
   <p:clrMapOvr>
     <a:masterClrMapping/>
   </p:clrMapOvr>
-  <p:timing>
-    <p:tnLst>
-      <p:par>
-        <p:cTn id="1" dur="indefinite" restart="never" nodeType="tmRoot"/>
-      </p:par>
-    </p:tnLst>
-  </p:timing>
 </p:sld>
 </file>
 
 <file path=ppt/slides/slide14.xml><?xml version="1.0" encoding="utf-8"?>
 <p:sld xmlns:a="http://schemas.openxmlformats.org/drawingml/2006/main" xmlns:r="http://schemas.openxmlformats.org/officeDocument/2006/relationships" xmlns:p="http://schemas.openxmlformats.org/presentationml/2006/main">
-  <p:cSld name="">
+  <p:cSld>
     <p:spTree>
       <p:nvGrpSpPr>
         <p:cNvPr id="1" name=""/>
@@ -4347,7 +4465,7 @@
             <a:spLocks noGrp="1"/>
           </p:cNvSpPr>
           <p:nvPr>
-            <p:ph type="obj" idx="1"/>
+            <p:ph idx="1"/>
           </p:nvPr>
         </p:nvSpPr>
         <p:spPr>
@@ -4384,7 +4502,9 @@
             <a:off x="457200" y="1536192"/>
             <a:ext cx="5340096" cy="4828032"/>
           </a:xfrm>
-          <a:prstGeom prst="rect"/>
+          <a:prstGeom prst="rect">
+            <a:avLst/>
+          </a:prstGeom>
           <a:ln>
             <a:solidFill>
               <a:schemeClr val="tx2">
@@ -4413,7 +4533,9 @@
             <a:off x="457200" y="1536192"/>
             <a:ext cx="5340096" cy="4828032"/>
           </a:xfrm>
-          <a:prstGeom prst="rect"/>
+          <a:prstGeom prst="rect">
+            <a:avLst/>
+          </a:prstGeom>
           <a:ln>
             <a:solidFill>
               <a:srgbClr val="FFFFFF"/>
@@ -4426,19 +4548,12 @@
   <p:clrMapOvr>
     <a:masterClrMapping/>
   </p:clrMapOvr>
-  <p:timing>
-    <p:tnLst>
-      <p:par>
-        <p:cTn id="1" dur="indefinite" restart="never" nodeType="tmRoot"/>
-      </p:par>
-    </p:tnLst>
-  </p:timing>
 </p:sld>
 </file>
 
 <file path=ppt/slides/slide15.xml><?xml version="1.0" encoding="utf-8"?>
 <p:sld xmlns:a="http://schemas.openxmlformats.org/drawingml/2006/main" xmlns:r="http://schemas.openxmlformats.org/officeDocument/2006/relationships" xmlns:p="http://schemas.openxmlformats.org/presentationml/2006/main">
-  <p:cSld name="">
+  <p:cSld>
     <p:spTree>
       <p:nvGrpSpPr>
         <p:cNvPr id="1" name=""/>
@@ -4481,7 +4596,7 @@
             <a:spLocks noGrp="1"/>
           </p:cNvSpPr>
           <p:nvPr>
-            <p:ph type="obj" idx="1"/>
+            <p:ph idx="1"/>
           </p:nvPr>
         </p:nvSpPr>
         <p:spPr>
@@ -4518,7 +4633,9 @@
             <a:off x="457200" y="1536192"/>
             <a:ext cx="5340096" cy="4828032"/>
           </a:xfrm>
-          <a:prstGeom prst="rect"/>
+          <a:prstGeom prst="rect">
+            <a:avLst/>
+          </a:prstGeom>
           <a:ln>
             <a:solidFill>
               <a:schemeClr val="tx2">
@@ -4547,7 +4664,9 @@
             <a:off x="457200" y="1536192"/>
             <a:ext cx="5340096" cy="4828032"/>
           </a:xfrm>
-          <a:prstGeom prst="rect"/>
+          <a:prstGeom prst="rect">
+            <a:avLst/>
+          </a:prstGeom>
           <a:ln>
             <a:solidFill>
               <a:srgbClr val="FFFFFF"/>
@@ -4560,19 +4679,12 @@
   <p:clrMapOvr>
     <a:masterClrMapping/>
   </p:clrMapOvr>
-  <p:timing>
-    <p:tnLst>
-      <p:par>
-        <p:cTn id="1" dur="indefinite" restart="never" nodeType="tmRoot"/>
-      </p:par>
-    </p:tnLst>
-  </p:timing>
 </p:sld>
 </file>
 
 <file path=ppt/slides/slide16.xml><?xml version="1.0" encoding="utf-8"?>
 <p:sld xmlns:a="http://schemas.openxmlformats.org/drawingml/2006/main" xmlns:r="http://schemas.openxmlformats.org/officeDocument/2006/relationships" xmlns:p="http://schemas.openxmlformats.org/presentationml/2006/main">
-  <p:cSld name="">
+  <p:cSld>
     <p:spTree>
       <p:nvGrpSpPr>
         <p:cNvPr id="1" name=""/>
@@ -4615,7 +4727,7 @@
             <a:spLocks noGrp="1"/>
           </p:cNvSpPr>
           <p:nvPr>
-            <p:ph type="obj" idx="1"/>
+            <p:ph idx="1"/>
           </p:nvPr>
         </p:nvSpPr>
         <p:spPr>
@@ -4652,7 +4764,9 @@
             <a:off x="457200" y="1536192"/>
             <a:ext cx="5340096" cy="4828032"/>
           </a:xfrm>
-          <a:prstGeom prst="rect"/>
+          <a:prstGeom prst="rect">
+            <a:avLst/>
+          </a:prstGeom>
           <a:ln>
             <a:solidFill>
               <a:schemeClr val="tx2">
@@ -4681,7 +4795,9 @@
             <a:off x="457200" y="1536192"/>
             <a:ext cx="5340096" cy="4828032"/>
           </a:xfrm>
-          <a:prstGeom prst="rect"/>
+          <a:prstGeom prst="rect">
+            <a:avLst/>
+          </a:prstGeom>
           <a:ln>
             <a:solidFill>
               <a:srgbClr val="FFFFFF"/>
@@ -4694,19 +4810,12 @@
   <p:clrMapOvr>
     <a:masterClrMapping/>
   </p:clrMapOvr>
-  <p:timing>
-    <p:tnLst>
-      <p:par>
-        <p:cTn id="1" dur="indefinite" restart="never" nodeType="tmRoot"/>
-      </p:par>
-    </p:tnLst>
-  </p:timing>
 </p:sld>
 </file>
 
 <file path=ppt/slides/slide17.xml><?xml version="1.0" encoding="utf-8"?>
 <p:sld xmlns:a="http://schemas.openxmlformats.org/drawingml/2006/main" xmlns:r="http://schemas.openxmlformats.org/officeDocument/2006/relationships" xmlns:p="http://schemas.openxmlformats.org/presentationml/2006/main">
-  <p:cSld name="">
+  <p:cSld>
     <p:spTree>
       <p:nvGrpSpPr>
         <p:cNvPr id="1" name=""/>
@@ -4749,7 +4858,7 @@
             <a:spLocks noGrp="1"/>
           </p:cNvSpPr>
           <p:nvPr>
-            <p:ph type="obj" idx="1"/>
+            <p:ph idx="1"/>
           </p:nvPr>
         </p:nvSpPr>
         <p:spPr>
@@ -4786,7 +4895,9 @@
             <a:off x="457200" y="1536192"/>
             <a:ext cx="5340096" cy="4828032"/>
           </a:xfrm>
-          <a:prstGeom prst="rect"/>
+          <a:prstGeom prst="rect">
+            <a:avLst/>
+          </a:prstGeom>
           <a:ln>
             <a:solidFill>
               <a:schemeClr val="tx2">
@@ -4815,7 +4926,9 @@
             <a:off x="457200" y="1536192"/>
             <a:ext cx="5340096" cy="4828032"/>
           </a:xfrm>
-          <a:prstGeom prst="rect"/>
+          <a:prstGeom prst="rect">
+            <a:avLst/>
+          </a:prstGeom>
           <a:ln>
             <a:solidFill>
               <a:srgbClr val="FFFFFF"/>
@@ -4828,19 +4941,12 @@
   <p:clrMapOvr>
     <a:masterClrMapping/>
   </p:clrMapOvr>
-  <p:timing>
-    <p:tnLst>
-      <p:par>
-        <p:cTn id="1" dur="indefinite" restart="never" nodeType="tmRoot"/>
-      </p:par>
-    </p:tnLst>
-  </p:timing>
 </p:sld>
 </file>
 
 <file path=ppt/slides/slide2.xml><?xml version="1.0" encoding="utf-8"?>
 <p:sld xmlns:a="http://schemas.openxmlformats.org/drawingml/2006/main" xmlns:r="http://schemas.openxmlformats.org/officeDocument/2006/relationships" xmlns:p="http://schemas.openxmlformats.org/presentationml/2006/main">
-  <p:cSld name="">
+  <p:cSld>
     <p:spTree>
       <p:nvGrpSpPr>
         <p:cNvPr id="1" name=""/>
@@ -4857,33 +4963,12 @@
       </p:grpSpPr>
       <p:sp>
         <p:nvSpPr>
-          <p:cNvPr id="2" name="Title 1"/>
-          <p:cNvSpPr>
-            <a:spLocks noGrp="1"/>
-          </p:cNvSpPr>
-          <p:nvPr>
-            <p:ph type="title"/>
-          </p:nvPr>
-        </p:nvSpPr>
-        <p:spPr/>
-        <p:txBody>
-          <a:bodyPr/>
-          <a:lstStyle/>
-          <a:p>
-            <a:r>
-              <a:t>Add Title Here</a:t>
-            </a:r>
-          </a:p>
-        </p:txBody>
-      </p:sp>
-      <p:sp>
-        <p:nvSpPr>
           <p:cNvPr id="3" name="Content Placeholder 2"/>
           <p:cNvSpPr>
             <a:spLocks noGrp="1"/>
           </p:cNvSpPr>
           <p:nvPr>
-            <p:ph type="obj" idx="1"/>
+            <p:ph idx="1"/>
           </p:nvPr>
         </p:nvSpPr>
         <p:spPr>
@@ -4897,6 +4982,7 @@
           <a:lstStyle/>
           <a:p>
             <a:r>
+              <a:rPr dirty="0"/>
               <a:t>Add Text Here</a:t>
             </a:r>
           </a:p>
@@ -4920,7 +5006,9 @@
             <a:off x="457200" y="1536192"/>
             <a:ext cx="5340096" cy="4828032"/>
           </a:xfrm>
-          <a:prstGeom prst="rect"/>
+          <a:prstGeom prst="rect">
+            <a:avLst/>
+          </a:prstGeom>
           <a:ln>
             <a:solidFill>
               <a:schemeClr val="tx2">
@@ -4949,7 +5037,9 @@
             <a:off x="457200" y="1536192"/>
             <a:ext cx="5340096" cy="4828032"/>
           </a:xfrm>
-          <a:prstGeom prst="rect"/>
+          <a:prstGeom prst="rect">
+            <a:avLst/>
+          </a:prstGeom>
           <a:ln>
             <a:solidFill>
               <a:srgbClr val="FFFFFF"/>
@@ -4957,24 +5047,42 @@
           </a:ln>
         </p:spPr>
       </p:pic>
+      <p:sp>
+        <p:nvSpPr>
+          <p:cNvPr id="7" name="Título 6">
+            <a:extLst>
+              <a:ext uri="{FF2B5EF4-FFF2-40B4-BE49-F238E27FC236}">
+                <a16:creationId xmlns:a16="http://schemas.microsoft.com/office/drawing/2014/main" id="{948FA649-D1B5-4EE2-9CC8-4B4B884848C8}"/>
+              </a:ext>
+            </a:extLst>
+          </p:cNvPr>
+          <p:cNvSpPr>
+            <a:spLocks noGrp="1"/>
+          </p:cNvSpPr>
+          <p:nvPr>
+            <p:ph type="title"/>
+          </p:nvPr>
+        </p:nvSpPr>
+        <p:spPr/>
+        <p:txBody>
+          <a:bodyPr/>
+          <a:lstStyle/>
+          <a:p>
+            <a:endParaRPr lang="es-ES"/>
+          </a:p>
+        </p:txBody>
+      </p:sp>
     </p:spTree>
   </p:cSld>
   <p:clrMapOvr>
     <a:masterClrMapping/>
   </p:clrMapOvr>
-  <p:timing>
-    <p:tnLst>
-      <p:par>
-        <p:cTn id="1" dur="indefinite" restart="never" nodeType="tmRoot"/>
-      </p:par>
-    </p:tnLst>
-  </p:timing>
 </p:sld>
 </file>
 
 <file path=ppt/slides/slide3.xml><?xml version="1.0" encoding="utf-8"?>
 <p:sld xmlns:a="http://schemas.openxmlformats.org/drawingml/2006/main" xmlns:r="http://schemas.openxmlformats.org/officeDocument/2006/relationships" xmlns:p="http://schemas.openxmlformats.org/presentationml/2006/main">
-  <p:cSld name="">
+  <p:cSld>
     <p:spTree>
       <p:nvGrpSpPr>
         <p:cNvPr id="1" name=""/>
@@ -5005,6 +5113,7 @@
           <a:lstStyle/>
           <a:p>
             <a:r>
+              <a:rPr dirty="0"/>
               <a:t>Add Title Here</a:t>
             </a:r>
           </a:p>
@@ -5017,7 +5126,7 @@
             <a:spLocks noGrp="1"/>
           </p:cNvSpPr>
           <p:nvPr>
-            <p:ph type="obj" idx="1"/>
+            <p:ph idx="1"/>
           </p:nvPr>
         </p:nvSpPr>
         <p:spPr>
@@ -5031,6 +5140,7 @@
           <a:lstStyle/>
           <a:p>
             <a:r>
+              <a:rPr dirty="0"/>
               <a:t>Add Text Here</a:t>
             </a:r>
           </a:p>
@@ -5054,7 +5164,9 @@
             <a:off x="457200" y="1536192"/>
             <a:ext cx="5340096" cy="4828032"/>
           </a:xfrm>
-          <a:prstGeom prst="rect"/>
+          <a:prstGeom prst="rect">
+            <a:avLst/>
+          </a:prstGeom>
           <a:ln>
             <a:solidFill>
               <a:schemeClr val="tx2">
@@ -5083,7 +5195,9 @@
             <a:off x="457200" y="1536192"/>
             <a:ext cx="5340096" cy="4828032"/>
           </a:xfrm>
-          <a:prstGeom prst="rect"/>
+          <a:prstGeom prst="rect">
+            <a:avLst/>
+          </a:prstGeom>
           <a:ln>
             <a:solidFill>
               <a:srgbClr val="FFFFFF"/>
@@ -5096,19 +5210,12 @@
   <p:clrMapOvr>
     <a:masterClrMapping/>
   </p:clrMapOvr>
-  <p:timing>
-    <p:tnLst>
-      <p:par>
-        <p:cTn id="1" dur="indefinite" restart="never" nodeType="tmRoot"/>
-      </p:par>
-    </p:tnLst>
-  </p:timing>
 </p:sld>
 </file>
 
 <file path=ppt/slides/slide4.xml><?xml version="1.0" encoding="utf-8"?>
 <p:sld xmlns:a="http://schemas.openxmlformats.org/drawingml/2006/main" xmlns:r="http://schemas.openxmlformats.org/officeDocument/2006/relationships" xmlns:p="http://schemas.openxmlformats.org/presentationml/2006/main">
-  <p:cSld name="">
+  <p:cSld>
     <p:spTree>
       <p:nvGrpSpPr>
         <p:cNvPr id="1" name=""/>
@@ -5151,7 +5258,7 @@
             <a:spLocks noGrp="1"/>
           </p:cNvSpPr>
           <p:nvPr>
-            <p:ph type="obj" idx="1"/>
+            <p:ph idx="1"/>
           </p:nvPr>
         </p:nvSpPr>
         <p:spPr>
@@ -5188,7 +5295,9 @@
             <a:off x="457200" y="1536192"/>
             <a:ext cx="5340096" cy="4828032"/>
           </a:xfrm>
-          <a:prstGeom prst="rect"/>
+          <a:prstGeom prst="rect">
+            <a:avLst/>
+          </a:prstGeom>
           <a:ln>
             <a:solidFill>
               <a:schemeClr val="tx2">
@@ -5217,7 +5326,9 @@
             <a:off x="457200" y="1536192"/>
             <a:ext cx="5340096" cy="4828032"/>
           </a:xfrm>
-          <a:prstGeom prst="rect"/>
+          <a:prstGeom prst="rect">
+            <a:avLst/>
+          </a:prstGeom>
           <a:ln>
             <a:solidFill>
               <a:srgbClr val="FFFFFF"/>
@@ -5230,19 +5341,12 @@
   <p:clrMapOvr>
     <a:masterClrMapping/>
   </p:clrMapOvr>
-  <p:timing>
-    <p:tnLst>
-      <p:par>
-        <p:cTn id="1" dur="indefinite" restart="never" nodeType="tmRoot"/>
-      </p:par>
-    </p:tnLst>
-  </p:timing>
 </p:sld>
 </file>
 
 <file path=ppt/slides/slide5.xml><?xml version="1.0" encoding="utf-8"?>
 <p:sld xmlns:a="http://schemas.openxmlformats.org/drawingml/2006/main" xmlns:r="http://schemas.openxmlformats.org/officeDocument/2006/relationships" xmlns:p="http://schemas.openxmlformats.org/presentationml/2006/main">
-  <p:cSld name="">
+  <p:cSld>
     <p:spTree>
       <p:nvGrpSpPr>
         <p:cNvPr id="1" name=""/>
@@ -5285,7 +5389,7 @@
             <a:spLocks noGrp="1"/>
           </p:cNvSpPr>
           <p:nvPr>
-            <p:ph type="obj" idx="1"/>
+            <p:ph idx="1"/>
           </p:nvPr>
         </p:nvSpPr>
         <p:spPr>
@@ -5322,7 +5426,9 @@
             <a:off x="457200" y="1536192"/>
             <a:ext cx="5340096" cy="4828032"/>
           </a:xfrm>
-          <a:prstGeom prst="rect"/>
+          <a:prstGeom prst="rect">
+            <a:avLst/>
+          </a:prstGeom>
           <a:ln>
             <a:solidFill>
               <a:schemeClr val="tx2">
@@ -5351,7 +5457,9 @@
             <a:off x="457200" y="1536192"/>
             <a:ext cx="5340096" cy="4828032"/>
           </a:xfrm>
-          <a:prstGeom prst="rect"/>
+          <a:prstGeom prst="rect">
+            <a:avLst/>
+          </a:prstGeom>
           <a:ln>
             <a:solidFill>
               <a:srgbClr val="FFFFFF"/>
@@ -5364,19 +5472,12 @@
   <p:clrMapOvr>
     <a:masterClrMapping/>
   </p:clrMapOvr>
-  <p:timing>
-    <p:tnLst>
-      <p:par>
-        <p:cTn id="1" dur="indefinite" restart="never" nodeType="tmRoot"/>
-      </p:par>
-    </p:tnLst>
-  </p:timing>
 </p:sld>
 </file>
 
 <file path=ppt/slides/slide6.xml><?xml version="1.0" encoding="utf-8"?>
 <p:sld xmlns:a="http://schemas.openxmlformats.org/drawingml/2006/main" xmlns:r="http://schemas.openxmlformats.org/officeDocument/2006/relationships" xmlns:p="http://schemas.openxmlformats.org/presentationml/2006/main">
-  <p:cSld name="">
+  <p:cSld>
     <p:spTree>
       <p:nvGrpSpPr>
         <p:cNvPr id="1" name=""/>
@@ -5391,53 +5492,6 @@
           <a:chExt cx="0" cy="0"/>
         </a:xfrm>
       </p:grpSpPr>
-      <p:sp>
-        <p:nvSpPr>
-          <p:cNvPr id="2" name="Title 1"/>
-          <p:cNvSpPr>
-            <a:spLocks noGrp="1"/>
-          </p:cNvSpPr>
-          <p:nvPr>
-            <p:ph type="title"/>
-          </p:nvPr>
-        </p:nvSpPr>
-        <p:spPr/>
-        <p:txBody>
-          <a:bodyPr/>
-          <a:lstStyle/>
-          <a:p>
-            <a:r>
-              <a:t>Add Title Here</a:t>
-            </a:r>
-          </a:p>
-        </p:txBody>
-      </p:sp>
-      <p:sp>
-        <p:nvSpPr>
-          <p:cNvPr id="3" name="Content Placeholder 2"/>
-          <p:cNvSpPr>
-            <a:spLocks noGrp="1"/>
-          </p:cNvSpPr>
-          <p:nvPr>
-            <p:ph type="obj" idx="1"/>
-          </p:nvPr>
-        </p:nvSpPr>
-        <p:spPr>
-          <a:xfrm>
-            <a:off x="6400800" y="1535722"/>
-            <a:ext cx="5486400" cy="4825245"/>
-          </a:xfrm>
-        </p:spPr>
-        <p:txBody>
-          <a:bodyPr/>
-          <a:lstStyle/>
-          <a:p>
-            <a:r>
-              <a:t>Add Text Here</a:t>
-            </a:r>
-          </a:p>
-        </p:txBody>
-      </p:sp>
       <p:pic>
         <p:nvPicPr>
           <p:cNvPr id="4" name="New picture"/>
@@ -5453,10 +5507,115 @@
         </p:blipFill>
         <p:spPr>
           <a:xfrm>
+            <a:off x="1702905" y="910083"/>
+            <a:ext cx="5340096" cy="4828032"/>
+          </a:xfrm>
+          <a:prstGeom prst="rect">
+            <a:avLst/>
+          </a:prstGeom>
+          <a:ln>
+            <a:solidFill>
+              <a:schemeClr val="tx2">
+                <a:lumMod val="60000"/>
+                <a:lumOff val="40000"/>
+              </a:schemeClr>
+            </a:solidFill>
+          </a:ln>
+        </p:spPr>
+      </p:pic>
+    </p:spTree>
+  </p:cSld>
+  <p:clrMapOvr>
+    <a:masterClrMapping/>
+  </p:clrMapOvr>
+</p:sld>
+</file>
+
+<file path=ppt/slides/slide7.xml><?xml version="1.0" encoding="utf-8"?>
+<p:sld xmlns:a="http://schemas.openxmlformats.org/drawingml/2006/main" xmlns:r="http://schemas.openxmlformats.org/officeDocument/2006/relationships" xmlns:p="http://schemas.openxmlformats.org/presentationml/2006/main">
+  <p:cSld>
+    <p:spTree>
+      <p:nvGrpSpPr>
+        <p:cNvPr id="1" name=""/>
+        <p:cNvGrpSpPr/>
+        <p:nvPr/>
+      </p:nvGrpSpPr>
+      <p:grpSpPr>
+        <a:xfrm>
+          <a:off x="0" y="0"/>
+          <a:ext cx="0" cy="0"/>
+          <a:chOff x="0" y="0"/>
+          <a:chExt cx="0" cy="0"/>
+        </a:xfrm>
+      </p:grpSpPr>
+      <p:sp>
+        <p:nvSpPr>
+          <p:cNvPr id="2" name="Title 1"/>
+          <p:cNvSpPr>
+            <a:spLocks noGrp="1"/>
+          </p:cNvSpPr>
+          <p:nvPr>
+            <p:ph type="title"/>
+          </p:nvPr>
+        </p:nvSpPr>
+        <p:spPr/>
+        <p:txBody>
+          <a:bodyPr/>
+          <a:lstStyle/>
+          <a:p>
+            <a:r>
+              <a:t>Add Title Here</a:t>
+            </a:r>
+          </a:p>
+        </p:txBody>
+      </p:sp>
+      <p:sp>
+        <p:nvSpPr>
+          <p:cNvPr id="3" name="Content Placeholder 2"/>
+          <p:cNvSpPr>
+            <a:spLocks noGrp="1"/>
+          </p:cNvSpPr>
+          <p:nvPr>
+            <p:ph idx="1"/>
+          </p:nvPr>
+        </p:nvSpPr>
+        <p:spPr>
+          <a:xfrm>
+            <a:off x="6400800" y="1535722"/>
+            <a:ext cx="5486400" cy="4825245"/>
+          </a:xfrm>
+        </p:spPr>
+        <p:txBody>
+          <a:bodyPr/>
+          <a:lstStyle/>
+          <a:p>
+            <a:r>
+              <a:t>Add Text Here</a:t>
+            </a:r>
+          </a:p>
+        </p:txBody>
+      </p:sp>
+      <p:pic>
+        <p:nvPicPr>
+          <p:cNvPr id="4" name="New picture"/>
+          <p:cNvPicPr/>
+          <p:nvPr/>
+        </p:nvPicPr>
+        <p:blipFill>
+          <a:blip r:embed="rId2"/>
+          <a:srcRect/>
+          <a:stretch>
+            <a:fillRect/>
+          </a:stretch>
+        </p:blipFill>
+        <p:spPr>
+          <a:xfrm>
             <a:off x="457200" y="1536192"/>
             <a:ext cx="5340096" cy="4828032"/>
           </a:xfrm>
-          <a:prstGeom prst="rect"/>
+          <a:prstGeom prst="rect">
+            <a:avLst/>
+          </a:prstGeom>
           <a:ln>
             <a:solidFill>
               <a:schemeClr val="tx2">
@@ -5485,7 +5644,9 @@
             <a:off x="457200" y="1536192"/>
             <a:ext cx="5340096" cy="4828032"/>
           </a:xfrm>
-          <a:prstGeom prst="rect"/>
+          <a:prstGeom prst="rect">
+            <a:avLst/>
+          </a:prstGeom>
           <a:ln>
             <a:solidFill>
               <a:srgbClr val="FFFFFF"/>
@@ -5498,19 +5659,12 @@
   <p:clrMapOvr>
     <a:masterClrMapping/>
   </p:clrMapOvr>
-  <p:timing>
-    <p:tnLst>
-      <p:par>
-        <p:cTn id="1" dur="indefinite" restart="never" nodeType="tmRoot"/>
-      </p:par>
-    </p:tnLst>
-  </p:timing>
 </p:sld>
 </file>
 
-<file path=ppt/slides/slide7.xml><?xml version="1.0" encoding="utf-8"?>
+<file path=ppt/slides/slide8.xml><?xml version="1.0" encoding="utf-8"?>
 <p:sld xmlns:a="http://schemas.openxmlformats.org/drawingml/2006/main" xmlns:r="http://schemas.openxmlformats.org/officeDocument/2006/relationships" xmlns:p="http://schemas.openxmlformats.org/presentationml/2006/main">
-  <p:cSld name="">
+  <p:cSld>
     <p:spTree>
       <p:nvGrpSpPr>
         <p:cNvPr id="1" name=""/>
@@ -5553,7 +5707,7 @@
             <a:spLocks noGrp="1"/>
           </p:cNvSpPr>
           <p:nvPr>
-            <p:ph type="obj" idx="1"/>
+            <p:ph idx="1"/>
           </p:nvPr>
         </p:nvSpPr>
         <p:spPr>
@@ -5590,7 +5744,9 @@
             <a:off x="457200" y="1536192"/>
             <a:ext cx="5340096" cy="4828032"/>
           </a:xfrm>
-          <a:prstGeom prst="rect"/>
+          <a:prstGeom prst="rect">
+            <a:avLst/>
+          </a:prstGeom>
           <a:ln>
             <a:solidFill>
               <a:schemeClr val="tx2">
@@ -5619,7 +5775,9 @@
             <a:off x="457200" y="1536192"/>
             <a:ext cx="5340096" cy="4828032"/>
           </a:xfrm>
-          <a:prstGeom prst="rect"/>
+          <a:prstGeom prst="rect">
+            <a:avLst/>
+          </a:prstGeom>
           <a:ln>
             <a:solidFill>
               <a:srgbClr val="FFFFFF"/>
@@ -5632,19 +5790,12 @@
   <p:clrMapOvr>
     <a:masterClrMapping/>
   </p:clrMapOvr>
-  <p:timing>
-    <p:tnLst>
-      <p:par>
-        <p:cTn id="1" dur="indefinite" restart="never" nodeType="tmRoot"/>
-      </p:par>
-    </p:tnLst>
-  </p:timing>
 </p:sld>
 </file>
 
-<file path=ppt/slides/slide8.xml><?xml version="1.0" encoding="utf-8"?>
+<file path=ppt/slides/slide9.xml><?xml version="1.0" encoding="utf-8"?>
 <p:sld xmlns:a="http://schemas.openxmlformats.org/drawingml/2006/main" xmlns:r="http://schemas.openxmlformats.org/officeDocument/2006/relationships" xmlns:p="http://schemas.openxmlformats.org/presentationml/2006/main">
-  <p:cSld name="">
+  <p:cSld>
     <p:spTree>
       <p:nvGrpSpPr>
         <p:cNvPr id="1" name=""/>
@@ -5687,7 +5838,7 @@
             <a:spLocks noGrp="1"/>
           </p:cNvSpPr>
           <p:nvPr>
-            <p:ph type="obj" idx="1"/>
+            <p:ph idx="1"/>
           </p:nvPr>
         </p:nvSpPr>
         <p:spPr>
@@ -5724,7 +5875,9 @@
             <a:off x="457200" y="1536192"/>
             <a:ext cx="5340096" cy="4828032"/>
           </a:xfrm>
-          <a:prstGeom prst="rect"/>
+          <a:prstGeom prst="rect">
+            <a:avLst/>
+          </a:prstGeom>
           <a:ln>
             <a:solidFill>
               <a:schemeClr val="tx2">
@@ -5753,7 +5906,9 @@
             <a:off x="457200" y="1536192"/>
             <a:ext cx="5340096" cy="4828032"/>
           </a:xfrm>
-          <a:prstGeom prst="rect"/>
+          <a:prstGeom prst="rect">
+            <a:avLst/>
+          </a:prstGeom>
           <a:ln>
             <a:solidFill>
               <a:srgbClr val="FFFFFF"/>
@@ -5766,152 +5921,11 @@
   <p:clrMapOvr>
     <a:masterClrMapping/>
   </p:clrMapOvr>
-  <p:timing>
-    <p:tnLst>
-      <p:par>
-        <p:cTn id="1" dur="indefinite" restart="never" nodeType="tmRoot"/>
-      </p:par>
-    </p:tnLst>
-  </p:timing>
-</p:sld>
-</file>
-
-<file path=ppt/slides/slide9.xml><?xml version="1.0" encoding="utf-8"?>
-<p:sld xmlns:a="http://schemas.openxmlformats.org/drawingml/2006/main" xmlns:r="http://schemas.openxmlformats.org/officeDocument/2006/relationships" xmlns:p="http://schemas.openxmlformats.org/presentationml/2006/main">
-  <p:cSld name="">
-    <p:spTree>
-      <p:nvGrpSpPr>
-        <p:cNvPr id="1" name=""/>
-        <p:cNvGrpSpPr/>
-        <p:nvPr/>
-      </p:nvGrpSpPr>
-      <p:grpSpPr>
-        <a:xfrm>
-          <a:off x="0" y="0"/>
-          <a:ext cx="0" cy="0"/>
-          <a:chOff x="0" y="0"/>
-          <a:chExt cx="0" cy="0"/>
-        </a:xfrm>
-      </p:grpSpPr>
-      <p:sp>
-        <p:nvSpPr>
-          <p:cNvPr id="2" name="Title 1"/>
-          <p:cNvSpPr>
-            <a:spLocks noGrp="1"/>
-          </p:cNvSpPr>
-          <p:nvPr>
-            <p:ph type="title"/>
-          </p:nvPr>
-        </p:nvSpPr>
-        <p:spPr/>
-        <p:txBody>
-          <a:bodyPr/>
-          <a:lstStyle/>
-          <a:p>
-            <a:r>
-              <a:t>Add Title Here</a:t>
-            </a:r>
-          </a:p>
-        </p:txBody>
-      </p:sp>
-      <p:sp>
-        <p:nvSpPr>
-          <p:cNvPr id="3" name="Content Placeholder 2"/>
-          <p:cNvSpPr>
-            <a:spLocks noGrp="1"/>
-          </p:cNvSpPr>
-          <p:nvPr>
-            <p:ph type="obj" idx="1"/>
-          </p:nvPr>
-        </p:nvSpPr>
-        <p:spPr>
-          <a:xfrm>
-            <a:off x="6400800" y="1535722"/>
-            <a:ext cx="5486400" cy="4825245"/>
-          </a:xfrm>
-        </p:spPr>
-        <p:txBody>
-          <a:bodyPr/>
-          <a:lstStyle/>
-          <a:p>
-            <a:r>
-              <a:t>Add Text Here</a:t>
-            </a:r>
-          </a:p>
-        </p:txBody>
-      </p:sp>
-      <p:pic>
-        <p:nvPicPr>
-          <p:cNvPr id="4" name="New picture"/>
-          <p:cNvPicPr/>
-          <p:nvPr/>
-        </p:nvPicPr>
-        <p:blipFill>
-          <a:blip r:embed="rId2"/>
-          <a:srcRect/>
-          <a:stretch>
-            <a:fillRect/>
-          </a:stretch>
-        </p:blipFill>
-        <p:spPr>
-          <a:xfrm>
-            <a:off x="457200" y="1536192"/>
-            <a:ext cx="5340096" cy="4828032"/>
-          </a:xfrm>
-          <a:prstGeom prst="rect"/>
-          <a:ln>
-            <a:solidFill>
-              <a:schemeClr val="tx2">
-                <a:lumMod val="60000"/>
-                <a:lumOff val="40000"/>
-              </a:schemeClr>
-            </a:solidFill>
-          </a:ln>
-        </p:spPr>
-      </p:pic>
-      <p:pic>
-        <p:nvPicPr>
-          <p:cNvPr id="5" name="New picture"/>
-          <p:cNvPicPr/>
-          <p:nvPr/>
-        </p:nvPicPr>
-        <p:blipFill>
-          <a:blip r:embed="rId2"/>
-          <a:srcRect/>
-          <a:stretch>
-            <a:fillRect/>
-          </a:stretch>
-        </p:blipFill>
-        <p:spPr>
-          <a:xfrm>
-            <a:off x="457200" y="1536192"/>
-            <a:ext cx="5340096" cy="4828032"/>
-          </a:xfrm>
-          <a:prstGeom prst="rect"/>
-          <a:ln>
-            <a:solidFill>
-              <a:srgbClr val="FFFFFF"/>
-            </a:solidFill>
-          </a:ln>
-        </p:spPr>
-      </p:pic>
-    </p:spTree>
-  </p:cSld>
-  <p:clrMapOvr>
-    <a:masterClrMapping/>
-  </p:clrMapOvr>
-  <p:timing>
-    <p:tnLst>
-      <p:par>
-        <p:cTn id="1" dur="indefinite" restart="never" nodeType="tmRoot"/>
-      </p:par>
-    </p:tnLst>
-  </p:timing>
 </p:sld>
 </file>
 
 <file path=ppt/tags/tag1.xml><?xml version="1.0" encoding="utf-8"?>
-<p:tagLst xmlns:p="http://schemas.openxmlformats.org/presentationml/2006/main">
+<p:tagLst xmlns:a="http://schemas.openxmlformats.org/drawingml/2006/main" xmlns:r="http://schemas.openxmlformats.org/officeDocument/2006/relationships" xmlns:p="http://schemas.openxmlformats.org/presentationml/2006/main">
   <p:tag name="AS_NET" val="4.0.30319.42000"/>
   <p:tag name="AS_OS" val="Microsoft Windows NT 10.0.14393.0"/>
   <p:tag name="AS_RELEASE_DATE" val="2013.12.17"/>
@@ -5963,7 +5977,7 @@
     </a:clrScheme>
     <a:fontScheme name="Office">
       <a:majorFont>
-        <a:latin typeface="Calibri Light" panose="020f0302020204030204"/>
+        <a:latin typeface="Calibri Light" panose="020F0302020204030204"/>
         <a:ea typeface=""/>
         <a:cs typeface=""/>
         <a:font script="Uigh" typeface="Microsoft Uighur"/>
@@ -5998,7 +6012,7 @@
         <a:font script="Syrc" typeface="Estrangelo Edessa"/>
       </a:majorFont>
       <a:minorFont>
-        <a:latin typeface="Calibri" panose="020f0502020204030204"/>
+        <a:latin typeface="Calibri" panose="020F0502020204030204"/>
         <a:ea typeface=""/>
         <a:cs typeface=""/>
         <a:font script="Uigh" typeface="Microsoft Uighur"/>
@@ -6125,7 +6139,7 @@
         </a:effectStyle>
         <a:effectStyle>
           <a:effectLst>
-            <a:outerShdw blurRad="57150" dir="5400000" dist="19050" algn="ctr" rotWithShape="0">
+            <a:outerShdw blurRad="57150" dist="19050" dir="5400000" algn="ctr" rotWithShape="0">
               <a:srgbClr val="000000">
                 <a:alpha val="63000"/>
               </a:srgbClr>
@@ -6175,5 +6189,6 @@
     </a:fmtScheme>
   </a:themeElements>
   <a:objectDefaults/>
+  <a:extraClrSchemeLst/>
 </a:theme>
 </file>
</xml_diff>